<commit_message>
dist array não funciona... que novidade
</commit_message>
<xml_diff>
--- a/x10.pptx
+++ b/x10.pptx
@@ -5,7 +5,7 @@
     <p:sldMasterId id="2147483648" r:id="rId1"/>
   </p:sldMasterIdLst>
   <p:notesMasterIdLst>
-    <p:notesMasterId r:id="rId16"/>
+    <p:notesMasterId r:id="rId20"/>
   </p:notesMasterIdLst>
   <p:sldIdLst>
     <p:sldId id="256" r:id="rId2"/>
@@ -14,14 +14,18 @@
     <p:sldId id="260" r:id="rId5"/>
     <p:sldId id="262" r:id="rId6"/>
     <p:sldId id="279" r:id="rId7"/>
-    <p:sldId id="263" r:id="rId8"/>
-    <p:sldId id="264" r:id="rId9"/>
-    <p:sldId id="265" r:id="rId10"/>
-    <p:sldId id="266" r:id="rId11"/>
-    <p:sldId id="267" r:id="rId12"/>
-    <p:sldId id="281" r:id="rId13"/>
-    <p:sldId id="280" r:id="rId14"/>
-    <p:sldId id="259" r:id="rId15"/>
+    <p:sldId id="283" r:id="rId8"/>
+    <p:sldId id="263" r:id="rId9"/>
+    <p:sldId id="264" r:id="rId10"/>
+    <p:sldId id="265" r:id="rId11"/>
+    <p:sldId id="266" r:id="rId12"/>
+    <p:sldId id="284" r:id="rId13"/>
+    <p:sldId id="267" r:id="rId14"/>
+    <p:sldId id="285" r:id="rId15"/>
+    <p:sldId id="281" r:id="rId16"/>
+    <p:sldId id="280" r:id="rId17"/>
+    <p:sldId id="259" r:id="rId18"/>
+    <p:sldId id="282" r:id="rId19"/>
   </p:sldIdLst>
   <p:sldSz cx="9144000" cy="6858000" type="screen4x3"/>
   <p:notesSz cx="6858000" cy="9144000"/>
@@ -205,7 +209,7 @@
           <a:p>
             <a:fld id="{1B921BD6-0921-4385-836B-BED76F1F0A66}" type="datetimeFigureOut">
               <a:rPr lang="pt-BR" smtClean="0"/>
-              <a:t>05/12/2016</a:t>
+              <a:t>07/12/2016</a:t>
             </a:fld>
             <a:endParaRPr lang="pt-BR"/>
           </a:p>
@@ -654,7 +658,7 @@
           <a:p>
             <a:fld id="{8B5C8B54-FFB1-44A6-80FE-9FB775708678}" type="datetimeFigureOut">
               <a:rPr lang="pt-BR" smtClean="0"/>
-              <a:t>05/12/2016</a:t>
+              <a:t>07/12/2016</a:t>
             </a:fld>
             <a:endParaRPr lang="pt-BR"/>
           </a:p>
@@ -824,7 +828,7 @@
           <a:p>
             <a:fld id="{8B5C8B54-FFB1-44A6-80FE-9FB775708678}" type="datetimeFigureOut">
               <a:rPr lang="pt-BR" smtClean="0"/>
-              <a:t>05/12/2016</a:t>
+              <a:t>07/12/2016</a:t>
             </a:fld>
             <a:endParaRPr lang="pt-BR"/>
           </a:p>
@@ -1004,7 +1008,7 @@
           <a:p>
             <a:fld id="{8B5C8B54-FFB1-44A6-80FE-9FB775708678}" type="datetimeFigureOut">
               <a:rPr lang="pt-BR" smtClean="0"/>
-              <a:t>05/12/2016</a:t>
+              <a:t>07/12/2016</a:t>
             </a:fld>
             <a:endParaRPr lang="pt-BR"/>
           </a:p>
@@ -1174,7 +1178,7 @@
           <a:p>
             <a:fld id="{8B5C8B54-FFB1-44A6-80FE-9FB775708678}" type="datetimeFigureOut">
               <a:rPr lang="pt-BR" smtClean="0"/>
-              <a:t>05/12/2016</a:t>
+              <a:t>07/12/2016</a:t>
             </a:fld>
             <a:endParaRPr lang="pt-BR"/>
           </a:p>
@@ -1420,7 +1424,7 @@
           <a:p>
             <a:fld id="{8B5C8B54-FFB1-44A6-80FE-9FB775708678}" type="datetimeFigureOut">
               <a:rPr lang="pt-BR" smtClean="0"/>
-              <a:t>05/12/2016</a:t>
+              <a:t>07/12/2016</a:t>
             </a:fld>
             <a:endParaRPr lang="pt-BR"/>
           </a:p>
@@ -1708,7 +1712,7 @@
           <a:p>
             <a:fld id="{8B5C8B54-FFB1-44A6-80FE-9FB775708678}" type="datetimeFigureOut">
               <a:rPr lang="pt-BR" smtClean="0"/>
-              <a:t>05/12/2016</a:t>
+              <a:t>07/12/2016</a:t>
             </a:fld>
             <a:endParaRPr lang="pt-BR"/>
           </a:p>
@@ -2130,7 +2134,7 @@
           <a:p>
             <a:fld id="{8B5C8B54-FFB1-44A6-80FE-9FB775708678}" type="datetimeFigureOut">
               <a:rPr lang="pt-BR" smtClean="0"/>
-              <a:t>05/12/2016</a:t>
+              <a:t>07/12/2016</a:t>
             </a:fld>
             <a:endParaRPr lang="pt-BR"/>
           </a:p>
@@ -2248,7 +2252,7 @@
           <a:p>
             <a:fld id="{8B5C8B54-FFB1-44A6-80FE-9FB775708678}" type="datetimeFigureOut">
               <a:rPr lang="pt-BR" smtClean="0"/>
-              <a:t>05/12/2016</a:t>
+              <a:t>07/12/2016</a:t>
             </a:fld>
             <a:endParaRPr lang="pt-BR"/>
           </a:p>
@@ -2343,7 +2347,7 @@
           <a:p>
             <a:fld id="{8B5C8B54-FFB1-44A6-80FE-9FB775708678}" type="datetimeFigureOut">
               <a:rPr lang="pt-BR" smtClean="0"/>
-              <a:t>05/12/2016</a:t>
+              <a:t>07/12/2016</a:t>
             </a:fld>
             <a:endParaRPr lang="pt-BR"/>
           </a:p>
@@ -2620,7 +2624,7 @@
           <a:p>
             <a:fld id="{8B5C8B54-FFB1-44A6-80FE-9FB775708678}" type="datetimeFigureOut">
               <a:rPr lang="pt-BR" smtClean="0"/>
-              <a:t>05/12/2016</a:t>
+              <a:t>07/12/2016</a:t>
             </a:fld>
             <a:endParaRPr lang="pt-BR"/>
           </a:p>
@@ -2873,7 +2877,7 @@
           <a:p>
             <a:fld id="{8B5C8B54-FFB1-44A6-80FE-9FB775708678}" type="datetimeFigureOut">
               <a:rPr lang="pt-BR" smtClean="0"/>
-              <a:t>05/12/2016</a:t>
+              <a:t>07/12/2016</a:t>
             </a:fld>
             <a:endParaRPr lang="pt-BR"/>
           </a:p>
@@ -3086,7 +3090,7 @@
           <a:p>
             <a:fld id="{8B5C8B54-FFB1-44A6-80FE-9FB775708678}" type="datetimeFigureOut">
               <a:rPr lang="pt-BR" smtClean="0"/>
-              <a:t>05/12/2016</a:t>
+              <a:t>07/12/2016</a:t>
             </a:fld>
             <a:endParaRPr lang="pt-BR"/>
           </a:p>
@@ -3574,7 +3578,7 @@
             <a:pPr algn="l"/>
             <a:r>
               <a:rPr lang="pt-BR" sz="2400" i="1" dirty="0" smtClean="0"/>
-              <a:t>atomic</a:t>
+              <a:t>finish</a:t>
             </a:r>
             <a:endParaRPr lang="pt-BR" sz="2400" i="1" dirty="0"/>
           </a:p>
@@ -3592,66 +3596,389 @@
         </p:nvSpPr>
         <p:spPr/>
         <p:txBody>
-          <a:bodyPr>
-            <a:noAutofit/>
-          </a:bodyPr>
+          <a:bodyPr/>
           <a:lstStyle/>
           <a:p>
             <a:r>
-              <a:rPr lang="en-US" altLang="pt-BR" sz="1800" b="1" i="1" dirty="0" err="1" smtClean="0">
+              <a:rPr lang="en-US" altLang="pt-BR" sz="2000" b="1" i="1" dirty="0" err="1" smtClean="0">
                 <a:cs typeface="Arial" pitchFamily="34" charset="0"/>
               </a:rPr>
               <a:t>Stmt</a:t>
             </a:r>
             <a:r>
-              <a:rPr lang="en-US" altLang="pt-BR" sz="1800" b="1" i="1" dirty="0" smtClean="0">
+              <a:rPr lang="en-US" altLang="pt-BR" sz="2000" b="1" i="1" dirty="0" smtClean="0">
                 <a:cs typeface="Arial" pitchFamily="34" charset="0"/>
               </a:rPr>
               <a:t> ::=  </a:t>
             </a:r>
             <a:r>
-              <a:rPr lang="en-US" altLang="pt-BR" sz="1800" b="1" dirty="0" smtClean="0">
+              <a:rPr lang="en-US" altLang="pt-BR" sz="2000" b="1" dirty="0" smtClean="0">
                 <a:solidFill>
                   <a:srgbClr val="C00000"/>
                 </a:solidFill>
                 <a:cs typeface="Arial" pitchFamily="34" charset="0"/>
               </a:rPr>
-              <a:t>atomic</a:t>
-            </a:r>
-            <a:r>
-              <a:rPr lang="en-US" altLang="pt-BR" sz="1800" b="1" dirty="0" smtClean="0">
+              <a:t>finish</a:t>
+            </a:r>
+            <a:r>
+              <a:rPr lang="en-US" altLang="pt-BR" sz="2000" b="1" dirty="0" smtClean="0">
                 <a:cs typeface="Arial" pitchFamily="34" charset="0"/>
               </a:rPr>
-              <a:t>  </a:t>
-            </a:r>
-            <a:r>
-              <a:rPr lang="en-US" altLang="pt-BR" sz="1800" b="1" i="1" dirty="0" smtClean="0">
+              <a:t> </a:t>
+            </a:r>
+            <a:r>
+              <a:rPr lang="en-US" altLang="pt-BR" sz="2000" b="1" i="1" dirty="0" smtClean="0">
+                <a:solidFill>
+                  <a:srgbClr val="C00000"/>
+                </a:solidFill>
                 <a:cs typeface="Arial" pitchFamily="34" charset="0"/>
               </a:rPr>
-              <a:t>Statement</a:t>
-            </a:r>
-          </a:p>
-          <a:p>
-            <a:r>
-              <a:rPr lang="en-US" altLang="pt-BR" sz="1800" b="1" i="1" dirty="0" err="1" smtClean="0">
+              <a:t> </a:t>
+            </a:r>
+            <a:r>
+              <a:rPr lang="en-US" altLang="pt-BR" sz="2000" b="1" i="1" dirty="0" err="1" smtClean="0">
                 <a:cs typeface="Arial" pitchFamily="34" charset="0"/>
               </a:rPr>
-              <a:t>MethodModifier</a:t>
-            </a:r>
-            <a:r>
-              <a:rPr lang="en-US" altLang="pt-BR" sz="1800" b="1" i="1" dirty="0" smtClean="0">
+              <a:t>Stmt</a:t>
+            </a:r>
+            <a:endParaRPr lang="en-US" altLang="pt-BR" sz="2000" b="1" i="1" dirty="0" smtClean="0">
+              <a:cs typeface="Arial" pitchFamily="34" charset="0"/>
+            </a:endParaRPr>
+          </a:p>
+          <a:p>
+            <a:endParaRPr lang="en-US" altLang="pt-BR" sz="1800" dirty="0" smtClean="0">
+              <a:solidFill>
+                <a:srgbClr val="000000"/>
+              </a:solidFill>
+              <a:cs typeface="Arial" pitchFamily="34" charset="0"/>
+            </a:endParaRPr>
+          </a:p>
+          <a:p>
+            <a:r>
+              <a:rPr lang="en-US" altLang="pt-BR" sz="1800" dirty="0">
+                <a:solidFill>
+                  <a:srgbClr val="000000"/>
+                </a:solidFill>
                 <a:cs typeface="Arial" pitchFamily="34" charset="0"/>
               </a:rPr>
-              <a:t> ::=  </a:t>
-            </a:r>
-            <a:r>
-              <a:rPr lang="en-US" altLang="pt-BR" sz="1800" b="1" dirty="0" smtClean="0">
-                <a:solidFill>
-                  <a:srgbClr val="C00000"/>
+              <a:t>f</a:t>
+            </a:r>
+            <a:r>
+              <a:rPr lang="en-US" altLang="pt-BR" sz="1800" dirty="0" smtClean="0">
+                <a:solidFill>
+                  <a:srgbClr val="000000"/>
                 </a:solidFill>
                 <a:cs typeface="Arial" pitchFamily="34" charset="0"/>
               </a:rPr>
-              <a:t>atomic</a:t>
+              <a:t>inish { … }</a:t>
+            </a:r>
+          </a:p>
+          <a:p>
+            <a:endParaRPr lang="en-US" altLang="pt-BR" sz="1800" dirty="0" smtClean="0">
+              <a:solidFill>
+                <a:srgbClr val="000000"/>
+              </a:solidFill>
+              <a:cs typeface="Arial" pitchFamily="34" charset="0"/>
+            </a:endParaRPr>
+          </a:p>
+          <a:p>
+            <a:r>
+              <a:rPr lang="en-US" altLang="pt-BR" sz="1800" dirty="0" err="1" smtClean="0">
+                <a:solidFill>
+                  <a:srgbClr val="000000"/>
+                </a:solidFill>
+                <a:cs typeface="Arial" pitchFamily="34" charset="0"/>
+              </a:rPr>
+              <a:t>Avalia</a:t>
+            </a:r>
+            <a:r>
+              <a:rPr lang="en-US" altLang="pt-BR" sz="1800" dirty="0" smtClean="0">
+                <a:solidFill>
+                  <a:srgbClr val="000000"/>
+                </a:solidFill>
+                <a:cs typeface="Arial" pitchFamily="34" charset="0"/>
+              </a:rPr>
+              <a:t> </a:t>
+            </a:r>
+            <a:r>
+              <a:rPr lang="en-US" altLang="pt-BR" sz="1800" dirty="0" err="1" smtClean="0">
+                <a:solidFill>
+                  <a:srgbClr val="000000"/>
+                </a:solidFill>
+                <a:cs typeface="Arial" pitchFamily="34" charset="0"/>
+              </a:rPr>
+              <a:t>uma</a:t>
+            </a:r>
+            <a:r>
+              <a:rPr lang="en-US" altLang="pt-BR" sz="1800" dirty="0" smtClean="0">
+                <a:solidFill>
+                  <a:srgbClr val="000000"/>
+                </a:solidFill>
+                <a:cs typeface="Arial" pitchFamily="34" charset="0"/>
+              </a:rPr>
+              <a:t> </a:t>
+            </a:r>
+            <a:r>
+              <a:rPr lang="en-US" altLang="pt-BR" sz="1800" dirty="0" err="1" smtClean="0">
+                <a:solidFill>
+                  <a:srgbClr val="000000"/>
+                </a:solidFill>
+                <a:cs typeface="Arial" pitchFamily="34" charset="0"/>
+              </a:rPr>
+              <a:t>expressão</a:t>
+            </a:r>
+            <a:r>
+              <a:rPr lang="en-US" altLang="pt-BR" sz="1800" dirty="0" smtClean="0">
+                <a:solidFill>
+                  <a:srgbClr val="000000"/>
+                </a:solidFill>
+                <a:cs typeface="Arial" pitchFamily="34" charset="0"/>
+              </a:rPr>
+              <a:t>, </a:t>
+            </a:r>
+            <a:r>
+              <a:rPr lang="en-US" altLang="pt-BR" sz="1800" dirty="0" err="1" smtClean="0">
+                <a:solidFill>
+                  <a:srgbClr val="000000"/>
+                </a:solidFill>
+                <a:cs typeface="Arial" pitchFamily="34" charset="0"/>
+              </a:rPr>
+              <a:t>esperando</a:t>
+            </a:r>
+            <a:r>
+              <a:rPr lang="en-US" altLang="pt-BR" sz="1800" dirty="0" smtClean="0">
+                <a:solidFill>
+                  <a:srgbClr val="000000"/>
+                </a:solidFill>
+                <a:cs typeface="Arial" pitchFamily="34" charset="0"/>
+              </a:rPr>
+              <a:t> </a:t>
+            </a:r>
+            <a:r>
+              <a:rPr lang="en-US" altLang="pt-BR" sz="1800" dirty="0" err="1" smtClean="0">
+                <a:solidFill>
+                  <a:srgbClr val="000000"/>
+                </a:solidFill>
+                <a:cs typeface="Arial" pitchFamily="34" charset="0"/>
+              </a:rPr>
+              <a:t>todas</a:t>
+            </a:r>
+            <a:r>
+              <a:rPr lang="en-US" altLang="pt-BR" sz="1800" dirty="0" smtClean="0">
+                <a:solidFill>
+                  <a:srgbClr val="000000"/>
+                </a:solidFill>
+                <a:cs typeface="Arial" pitchFamily="34" charset="0"/>
+              </a:rPr>
+              <a:t> as </a:t>
+            </a:r>
+            <a:r>
+              <a:rPr lang="en-US" altLang="pt-BR" sz="1800" dirty="0" err="1" smtClean="0">
+                <a:solidFill>
+                  <a:srgbClr val="000000"/>
+                </a:solidFill>
+                <a:cs typeface="Arial" pitchFamily="34" charset="0"/>
+              </a:rPr>
+              <a:t>atividades</a:t>
+            </a:r>
+            <a:r>
+              <a:rPr lang="en-US" altLang="pt-BR" sz="1800" dirty="0" smtClean="0">
+                <a:solidFill>
+                  <a:srgbClr val="000000"/>
+                </a:solidFill>
+                <a:cs typeface="Arial" pitchFamily="34" charset="0"/>
+              </a:rPr>
+              <a:t> </a:t>
+            </a:r>
+            <a:r>
+              <a:rPr lang="en-US" altLang="pt-BR" sz="1800" dirty="0" err="1" smtClean="0">
+                <a:solidFill>
+                  <a:srgbClr val="000000"/>
+                </a:solidFill>
+                <a:cs typeface="Arial" pitchFamily="34" charset="0"/>
+              </a:rPr>
+              <a:t>criadas</a:t>
+            </a:r>
+            <a:r>
+              <a:rPr lang="en-US" altLang="pt-BR" sz="1800" dirty="0" smtClean="0">
+                <a:solidFill>
+                  <a:srgbClr val="000000"/>
+                </a:solidFill>
+                <a:cs typeface="Arial" pitchFamily="34" charset="0"/>
+              </a:rPr>
+              <a:t> </a:t>
+            </a:r>
+            <a:r>
+              <a:rPr lang="en-US" altLang="pt-BR" sz="1800" dirty="0" err="1" smtClean="0">
+                <a:solidFill>
+                  <a:srgbClr val="000000"/>
+                </a:solidFill>
+                <a:cs typeface="Arial" pitchFamily="34" charset="0"/>
+              </a:rPr>
+              <a:t>por</a:t>
+            </a:r>
+            <a:r>
+              <a:rPr lang="en-US" altLang="pt-BR" sz="1800" dirty="0" smtClean="0">
+                <a:solidFill>
+                  <a:srgbClr val="000000"/>
+                </a:solidFill>
+                <a:cs typeface="Arial" pitchFamily="34" charset="0"/>
+              </a:rPr>
+              <a:t> </a:t>
+            </a:r>
+            <a:r>
+              <a:rPr lang="en-US" altLang="pt-BR" sz="1800" dirty="0" err="1" smtClean="0">
+                <a:solidFill>
+                  <a:srgbClr val="000000"/>
+                </a:solidFill>
+                <a:cs typeface="Arial" pitchFamily="34" charset="0"/>
+              </a:rPr>
+              <a:t>chamadas</a:t>
+            </a:r>
+            <a:r>
+              <a:rPr lang="en-US" altLang="pt-BR" sz="1800" dirty="0" smtClean="0">
+                <a:solidFill>
+                  <a:srgbClr val="000000"/>
+                </a:solidFill>
+                <a:cs typeface="Arial" pitchFamily="34" charset="0"/>
+              </a:rPr>
+              <a:t> </a:t>
+            </a:r>
+            <a:r>
+              <a:rPr lang="en-US" altLang="pt-BR" sz="1800" dirty="0" err="1" smtClean="0">
+                <a:solidFill>
+                  <a:srgbClr val="000000"/>
+                </a:solidFill>
+                <a:cs typeface="Arial" pitchFamily="34" charset="0"/>
+              </a:rPr>
+              <a:t>async</a:t>
+            </a:r>
+            <a:r>
+              <a:rPr lang="en-US" altLang="pt-BR" sz="1800" dirty="0" smtClean="0">
+                <a:solidFill>
+                  <a:srgbClr val="000000"/>
+                </a:solidFill>
+                <a:cs typeface="Arial" pitchFamily="34" charset="0"/>
+              </a:rPr>
+              <a:t> </a:t>
+            </a:r>
+            <a:r>
+              <a:rPr lang="en-US" altLang="pt-BR" sz="1800" dirty="0" err="1" smtClean="0">
+                <a:solidFill>
+                  <a:srgbClr val="000000"/>
+                </a:solidFill>
+                <a:cs typeface="Arial" pitchFamily="34" charset="0"/>
+              </a:rPr>
+              <a:t>terminarem</a:t>
+            </a:r>
+            <a:r>
+              <a:rPr lang="en-US" altLang="pt-BR" sz="1800" dirty="0" smtClean="0">
+                <a:solidFill>
+                  <a:srgbClr val="000000"/>
+                </a:solidFill>
+                <a:cs typeface="Arial" pitchFamily="34" charset="0"/>
+              </a:rPr>
+              <a:t>.</a:t>
+            </a:r>
+          </a:p>
+          <a:p>
+            <a:endParaRPr lang="en-US" altLang="pt-BR" sz="1800" dirty="0" smtClean="0">
+              <a:solidFill>
+                <a:srgbClr val="000000"/>
+              </a:solidFill>
+              <a:cs typeface="Arial" pitchFamily="34" charset="0"/>
+            </a:endParaRPr>
+          </a:p>
+          <a:p>
+            <a:r>
+              <a:rPr lang="en-US" altLang="pt-BR" sz="1800" dirty="0" err="1" smtClean="0">
+                <a:solidFill>
+                  <a:srgbClr val="000000"/>
+                </a:solidFill>
+                <a:cs typeface="Arial" pitchFamily="34" charset="0"/>
+              </a:rPr>
+              <a:t>Pode</a:t>
+            </a:r>
+            <a:r>
+              <a:rPr lang="en-US" altLang="pt-BR" sz="1800" dirty="0" smtClean="0">
+                <a:solidFill>
+                  <a:srgbClr val="000000"/>
+                </a:solidFill>
+                <a:cs typeface="Arial" pitchFamily="34" charset="0"/>
+              </a:rPr>
+              <a:t> </a:t>
+            </a:r>
+            <a:r>
+              <a:rPr lang="en-US" altLang="pt-BR" sz="1800" dirty="0" err="1" smtClean="0">
+                <a:solidFill>
+                  <a:srgbClr val="000000"/>
+                </a:solidFill>
+                <a:cs typeface="Arial" pitchFamily="34" charset="0"/>
+              </a:rPr>
+              <a:t>ser</a:t>
+            </a:r>
+            <a:r>
+              <a:rPr lang="en-US" altLang="pt-BR" sz="1800" dirty="0" smtClean="0">
+                <a:solidFill>
+                  <a:srgbClr val="000000"/>
+                </a:solidFill>
+                <a:cs typeface="Arial" pitchFamily="34" charset="0"/>
+              </a:rPr>
+              <a:t> </a:t>
+            </a:r>
+            <a:r>
+              <a:rPr lang="en-US" altLang="pt-BR" sz="1800" dirty="0" err="1" smtClean="0">
+                <a:solidFill>
+                  <a:srgbClr val="000000"/>
+                </a:solidFill>
+                <a:cs typeface="Arial" pitchFamily="34" charset="0"/>
+              </a:rPr>
+              <a:t>considerado</a:t>
+            </a:r>
+            <a:r>
+              <a:rPr lang="en-US" altLang="pt-BR" sz="1800" dirty="0" smtClean="0">
+                <a:solidFill>
+                  <a:srgbClr val="000000"/>
+                </a:solidFill>
+                <a:cs typeface="Arial" pitchFamily="34" charset="0"/>
+              </a:rPr>
+              <a:t> um </a:t>
+            </a:r>
+            <a:r>
+              <a:rPr lang="en-US" altLang="pt-BR" sz="1800" dirty="0" err="1" smtClean="0">
+                <a:solidFill>
+                  <a:srgbClr val="000000"/>
+                </a:solidFill>
+                <a:cs typeface="Arial" pitchFamily="34" charset="0"/>
+              </a:rPr>
+              <a:t>mecanismo</a:t>
+            </a:r>
+            <a:r>
+              <a:rPr lang="en-US" altLang="pt-BR" sz="1800" dirty="0" smtClean="0">
+                <a:solidFill>
+                  <a:srgbClr val="000000"/>
+                </a:solidFill>
+                <a:cs typeface="Arial" pitchFamily="34" charset="0"/>
+              </a:rPr>
+              <a:t> de </a:t>
+            </a:r>
+            <a:r>
+              <a:rPr lang="en-US" altLang="pt-BR" sz="1800" dirty="0" err="1" smtClean="0">
+                <a:solidFill>
+                  <a:srgbClr val="000000"/>
+                </a:solidFill>
+                <a:cs typeface="Arial" pitchFamily="34" charset="0"/>
+              </a:rPr>
+              <a:t>barreira</a:t>
+            </a:r>
+            <a:r>
+              <a:rPr lang="en-US" altLang="pt-BR" sz="1800" dirty="0" smtClean="0">
+                <a:solidFill>
+                  <a:srgbClr val="000000"/>
+                </a:solidFill>
+                <a:cs typeface="Arial" pitchFamily="34" charset="0"/>
+              </a:rPr>
+              <a:t>.</a:t>
             </a:r>
           </a:p>
           <a:p>
@@ -3659,75 +3986,22 @@
           </a:p>
           <a:p>
             <a:r>
-              <a:rPr lang="pt-BR" sz="1800" dirty="0"/>
-              <a:t>a</a:t>
-            </a:r>
-            <a:r>
               <a:rPr lang="pt-BR" sz="1800" dirty="0" smtClean="0"/>
-              <a:t>tomic { ... </a:t>
-            </a:r>
-            <a:r>
-              <a:rPr lang="pt-BR" sz="1800" dirty="0"/>
-              <a:t>}</a:t>
-            </a:r>
-            <a:endParaRPr lang="pt-BR" sz="1800" dirty="0" smtClean="0"/>
-          </a:p>
-          <a:p>
-            <a:endParaRPr lang="pt-BR" sz="1800" dirty="0" smtClean="0"/>
-          </a:p>
-          <a:p>
-            <a:r>
-              <a:rPr lang="pt-BR" sz="1800" dirty="0" smtClean="0"/>
-              <a:t>Executa um bloco de código de forma atômica.</a:t>
-            </a:r>
+              <a:t>Útil para expressar operações “síncronas”.</a:t>
+            </a:r>
+          </a:p>
+          <a:p>
             <a:endParaRPr lang="pt-BR" sz="1800" dirty="0"/>
           </a:p>
           <a:p>
-            <a:pPr marL="0" indent="0">
-              <a:buNone/>
-            </a:pPr>
-            <a:endParaRPr lang="pt-BR" sz="1800" dirty="0" smtClean="0"/>
-          </a:p>
-          <a:p>
-            <a:r>
-              <a:rPr lang="pt-BR" sz="1800" dirty="0" smtClean="0"/>
-              <a:t>Pode ser utilizado em métodos ou em trechos de código.</a:t>
-            </a:r>
-          </a:p>
-          <a:p>
-            <a:endParaRPr lang="pt-BR" sz="1800" dirty="0"/>
-          </a:p>
-          <a:p>
-            <a:r>
-              <a:rPr lang="pt-BR" sz="1800" dirty="0" smtClean="0"/>
-              <a:t>Blocos atômicos são executados enquanto outras atividades são suspensas.</a:t>
-            </a:r>
-          </a:p>
-          <a:p>
-            <a:endParaRPr lang="pt-BR" sz="1800" dirty="0" smtClean="0"/>
-          </a:p>
-          <a:p>
-            <a:r>
-              <a:rPr lang="pt-BR" altLang="pt-BR" sz="1800" dirty="0" smtClean="0"/>
-              <a:t>Não deve criar atividades concorrentes.</a:t>
-            </a:r>
-          </a:p>
-          <a:p>
-            <a:endParaRPr lang="pt-BR" altLang="pt-BR" sz="1800" dirty="0"/>
-          </a:p>
-          <a:p>
-            <a:r>
-              <a:rPr lang="pt-BR" altLang="pt-BR" sz="1800" dirty="0" smtClean="0"/>
-              <a:t>Deve manipular dados locais.</a:t>
-            </a:r>
-            <a:endParaRPr lang="pt-BR" sz="1800" dirty="0"/>
+            <a:endParaRPr lang="pt-BR" sz="2000" dirty="0" smtClean="0"/>
           </a:p>
         </p:txBody>
       </p:sp>
     </p:spTree>
     <p:extLst>
       <p:ext uri="{BB962C8B-B14F-4D97-AF65-F5344CB8AC3E}">
-        <p14:creationId xmlns:p14="http://schemas.microsoft.com/office/powerpoint/2010/main" val="2111058723"/>
+        <p14:creationId xmlns:p14="http://schemas.microsoft.com/office/powerpoint/2010/main" val="3994443213"/>
       </p:ext>
     </p:extLst>
   </p:cSld>
@@ -3766,15 +4040,17 @@
         </p:nvSpPr>
         <p:spPr/>
         <p:txBody>
-          <a:bodyPr/>
+          <a:bodyPr>
+            <a:normAutofit/>
+          </a:bodyPr>
           <a:lstStyle/>
           <a:p>
-            <a:pPr algn="just"/>
+            <a:pPr algn="l"/>
             <a:r>
               <a:rPr lang="pt-BR" sz="2400" i="1" dirty="0" smtClean="0"/>
-              <a:t>GlobalRef</a:t>
-            </a:r>
-            <a:endParaRPr lang="pt-BR" i="1" dirty="0"/>
+              <a:t>atomic</a:t>
+            </a:r>
+            <a:endParaRPr lang="pt-BR" sz="2400" i="1" dirty="0"/>
           </a:p>
         </p:txBody>
       </p:sp>
@@ -3790,10 +4066,1159 @@
         </p:nvSpPr>
         <p:spPr/>
         <p:txBody>
+          <a:bodyPr>
+            <a:noAutofit/>
+          </a:bodyPr>
+          <a:lstStyle/>
+          <a:p>
+            <a:r>
+              <a:rPr lang="en-US" altLang="pt-BR" sz="1800" b="1" i="1" dirty="0" err="1" smtClean="0">
+                <a:cs typeface="Arial" pitchFamily="34" charset="0"/>
+              </a:rPr>
+              <a:t>Stmt</a:t>
+            </a:r>
+            <a:r>
+              <a:rPr lang="en-US" altLang="pt-BR" sz="1800" b="1" i="1" dirty="0" smtClean="0">
+                <a:cs typeface="Arial" pitchFamily="34" charset="0"/>
+              </a:rPr>
+              <a:t> ::=  </a:t>
+            </a:r>
+            <a:r>
+              <a:rPr lang="en-US" altLang="pt-BR" sz="1800" b="1" dirty="0" smtClean="0">
+                <a:solidFill>
+                  <a:srgbClr val="C00000"/>
+                </a:solidFill>
+                <a:cs typeface="Arial" pitchFamily="34" charset="0"/>
+              </a:rPr>
+              <a:t>atomic</a:t>
+            </a:r>
+            <a:r>
+              <a:rPr lang="en-US" altLang="pt-BR" sz="1800" b="1" dirty="0" smtClean="0">
+                <a:cs typeface="Arial" pitchFamily="34" charset="0"/>
+              </a:rPr>
+              <a:t>  </a:t>
+            </a:r>
+            <a:r>
+              <a:rPr lang="en-US" altLang="pt-BR" sz="1800" b="1" i="1" dirty="0" smtClean="0">
+                <a:cs typeface="Arial" pitchFamily="34" charset="0"/>
+              </a:rPr>
+              <a:t>Statement</a:t>
+            </a:r>
+          </a:p>
+          <a:p>
+            <a:r>
+              <a:rPr lang="en-US" altLang="pt-BR" sz="1800" b="1" i="1" dirty="0" err="1" smtClean="0">
+                <a:cs typeface="Arial" pitchFamily="34" charset="0"/>
+              </a:rPr>
+              <a:t>MethodModifier</a:t>
+            </a:r>
+            <a:r>
+              <a:rPr lang="en-US" altLang="pt-BR" sz="1800" b="1" i="1" dirty="0" smtClean="0">
+                <a:cs typeface="Arial" pitchFamily="34" charset="0"/>
+              </a:rPr>
+              <a:t> ::=  </a:t>
+            </a:r>
+            <a:r>
+              <a:rPr lang="en-US" altLang="pt-BR" sz="1800" b="1" dirty="0" smtClean="0">
+                <a:solidFill>
+                  <a:srgbClr val="C00000"/>
+                </a:solidFill>
+                <a:cs typeface="Arial" pitchFamily="34" charset="0"/>
+              </a:rPr>
+              <a:t>atomic</a:t>
+            </a:r>
+          </a:p>
+          <a:p>
+            <a:endParaRPr lang="pt-BR" sz="1800" dirty="0" smtClean="0"/>
+          </a:p>
+          <a:p>
+            <a:r>
+              <a:rPr lang="pt-BR" sz="1800" dirty="0"/>
+              <a:t>a</a:t>
+            </a:r>
+            <a:r>
+              <a:rPr lang="pt-BR" sz="1800" dirty="0" smtClean="0"/>
+              <a:t>tomic { ... </a:t>
+            </a:r>
+            <a:r>
+              <a:rPr lang="pt-BR" sz="1800" dirty="0"/>
+              <a:t>}</a:t>
+            </a:r>
+            <a:endParaRPr lang="pt-BR" sz="1800" dirty="0" smtClean="0"/>
+          </a:p>
+          <a:p>
+            <a:endParaRPr lang="pt-BR" sz="1800" dirty="0" smtClean="0"/>
+          </a:p>
+          <a:p>
+            <a:r>
+              <a:rPr lang="pt-BR" sz="1800" dirty="0" smtClean="0"/>
+              <a:t>Executa um bloco de código de forma atômica.</a:t>
+            </a:r>
+            <a:endParaRPr lang="pt-BR" sz="1800" dirty="0"/>
+          </a:p>
+          <a:p>
+            <a:pPr marL="0" indent="0">
+              <a:buNone/>
+            </a:pPr>
+            <a:endParaRPr lang="pt-BR" sz="1800" dirty="0" smtClean="0"/>
+          </a:p>
+          <a:p>
+            <a:r>
+              <a:rPr lang="pt-BR" sz="1800" dirty="0" smtClean="0"/>
+              <a:t>Pode ser utilizado em métodos ou em trechos de código.</a:t>
+            </a:r>
+          </a:p>
+          <a:p>
+            <a:endParaRPr lang="pt-BR" sz="1800" dirty="0"/>
+          </a:p>
+          <a:p>
+            <a:r>
+              <a:rPr lang="pt-BR" sz="1800" dirty="0" smtClean="0"/>
+              <a:t>Blocos atômicos são executados enquanto outras atividades são suspensas.</a:t>
+            </a:r>
+          </a:p>
+          <a:p>
+            <a:endParaRPr lang="pt-BR" sz="1800" dirty="0" smtClean="0"/>
+          </a:p>
+          <a:p>
+            <a:r>
+              <a:rPr lang="pt-BR" altLang="pt-BR" sz="1800" dirty="0" smtClean="0"/>
+              <a:t>Não deve criar atividades concorrentes.</a:t>
+            </a:r>
+          </a:p>
+          <a:p>
+            <a:endParaRPr lang="pt-BR" altLang="pt-BR" sz="1800" dirty="0"/>
+          </a:p>
+          <a:p>
+            <a:r>
+              <a:rPr lang="pt-BR" altLang="pt-BR" sz="1800" dirty="0" smtClean="0"/>
+              <a:t>Deve manipular dados locais.</a:t>
+            </a:r>
+            <a:endParaRPr lang="pt-BR" sz="1800" dirty="0"/>
+          </a:p>
+        </p:txBody>
+      </p:sp>
+    </p:spTree>
+    <p:extLst>
+      <p:ext uri="{BB962C8B-B14F-4D97-AF65-F5344CB8AC3E}">
+        <p14:creationId xmlns:p14="http://schemas.microsoft.com/office/powerpoint/2010/main" val="2111058723"/>
+      </p:ext>
+    </p:extLst>
+  </p:cSld>
+  <p:clrMapOvr>
+    <a:masterClrMapping/>
+  </p:clrMapOvr>
+  <p:timing>
+    <p:tnLst>
+      <p:par>
+        <p:cTn id="1" dur="indefinite" restart="never" nodeType="tmRoot"/>
+      </p:par>
+    </p:tnLst>
+  </p:timing>
+</p:sld>
+</file>
+
+<file path=ppt/slides/slide12.xml><?xml version="1.0" encoding="utf-8"?>
+<p:sld xmlns:a="http://schemas.openxmlformats.org/drawingml/2006/main" xmlns:r="http://schemas.openxmlformats.org/officeDocument/2006/relationships" xmlns:p="http://schemas.openxmlformats.org/presentationml/2006/main">
+  <p:cSld>
+    <p:spTree>
+      <p:nvGrpSpPr>
+        <p:cNvPr id="1" name=""/>
+        <p:cNvGrpSpPr/>
+        <p:nvPr/>
+      </p:nvGrpSpPr>
+      <p:grpSpPr>
+        <a:xfrm>
+          <a:off x="0" y="0"/>
+          <a:ext cx="0" cy="0"/>
+          <a:chOff x="0" y="0"/>
+          <a:chExt cx="0" cy="0"/>
+        </a:xfrm>
+      </p:grpSpPr>
+      <p:sp>
+        <p:nvSpPr>
+          <p:cNvPr id="2" name="Title 1"/>
+          <p:cNvSpPr>
+            <a:spLocks noGrp="1"/>
+          </p:cNvSpPr>
+          <p:nvPr>
+            <p:ph type="title"/>
+          </p:nvPr>
+        </p:nvSpPr>
+        <p:spPr/>
+        <p:txBody>
           <a:bodyPr/>
           <a:lstStyle/>
           <a:p>
-            <a:endParaRPr lang="pt-BR"/>
+            <a:pPr algn="just"/>
+            <a:r>
+              <a:rPr lang="pt-BR" sz="2400" i="1" dirty="0" smtClean="0"/>
+              <a:t>GlobalRef</a:t>
+            </a:r>
+            <a:endParaRPr lang="pt-BR" i="1" dirty="0"/>
+          </a:p>
+        </p:txBody>
+      </p:sp>
+      <p:sp>
+        <p:nvSpPr>
+          <p:cNvPr id="3" name="Content Placeholder 2"/>
+          <p:cNvSpPr>
+            <a:spLocks noGrp="1"/>
+          </p:cNvSpPr>
+          <p:nvPr>
+            <p:ph idx="1"/>
+          </p:nvPr>
+        </p:nvSpPr>
+        <p:spPr/>
+        <p:txBody>
+          <a:bodyPr>
+            <a:noAutofit/>
+          </a:bodyPr>
+          <a:lstStyle/>
+          <a:p>
+            <a:endParaRPr lang="pt-BR" sz="1200" dirty="0"/>
+          </a:p>
+        </p:txBody>
+      </p:sp>
+    </p:spTree>
+    <p:extLst>
+      <p:ext uri="{BB962C8B-B14F-4D97-AF65-F5344CB8AC3E}">
+        <p14:creationId xmlns:p14="http://schemas.microsoft.com/office/powerpoint/2010/main" val="2736402811"/>
+      </p:ext>
+    </p:extLst>
+  </p:cSld>
+  <p:clrMapOvr>
+    <a:masterClrMapping/>
+  </p:clrMapOvr>
+  <p:timing>
+    <p:tnLst>
+      <p:par>
+        <p:cTn id="1" dur="indefinite" restart="never" nodeType="tmRoot"/>
+      </p:par>
+    </p:tnLst>
+  </p:timing>
+</p:sld>
+</file>
+
+<file path=ppt/slides/slide13.xml><?xml version="1.0" encoding="utf-8"?>
+<p:sld xmlns:a="http://schemas.openxmlformats.org/drawingml/2006/main" xmlns:r="http://schemas.openxmlformats.org/officeDocument/2006/relationships" xmlns:p="http://schemas.openxmlformats.org/presentationml/2006/main">
+  <p:cSld>
+    <p:spTree>
+      <p:nvGrpSpPr>
+        <p:cNvPr id="1" name=""/>
+        <p:cNvGrpSpPr/>
+        <p:nvPr/>
+      </p:nvGrpSpPr>
+      <p:grpSpPr>
+        <a:xfrm>
+          <a:off x="0" y="0"/>
+          <a:ext cx="0" cy="0"/>
+          <a:chOff x="0" y="0"/>
+          <a:chExt cx="0" cy="0"/>
+        </a:xfrm>
+      </p:grpSpPr>
+      <p:pic>
+        <p:nvPicPr>
+          <p:cNvPr id="5" name="Picture 10" descr="object.eps"/>
+          <p:cNvPicPr>
+            <a:picLocks noChangeAspect="1"/>
+          </p:cNvPicPr>
+          <p:nvPr/>
+        </p:nvPicPr>
+        <p:blipFill>
+          <a:blip r:embed="rId2" cstate="print">
+            <a:extLst>
+              <a:ext uri="{28A0092B-C50C-407E-A947-70E740481C1C}">
+                <a14:useLocalDpi xmlns:a14="http://schemas.microsoft.com/office/drawing/2010/main" val="0"/>
+              </a:ext>
+            </a:extLst>
+          </a:blip>
+          <a:srcRect/>
+          <a:stretch>
+            <a:fillRect/>
+          </a:stretch>
+        </p:blipFill>
+        <p:spPr bwMode="auto">
+          <a:xfrm>
+            <a:off x="5024738" y="404664"/>
+            <a:ext cx="4089400" cy="3871912"/>
+          </a:xfrm>
+          <a:prstGeom prst="rect">
+            <a:avLst/>
+          </a:prstGeom>
+          <a:noFill/>
+          <a:ln>
+            <a:noFill/>
+          </a:ln>
+          <a:extLst>
+            <a:ext uri="{909E8E84-426E-40DD-AFC4-6F175D3DCCD1}">
+              <a14:hiddenFill xmlns:a14="http://schemas.microsoft.com/office/drawing/2010/main">
+                <a:solidFill>
+                  <a:srgbClr val="FFFFFF"/>
+                </a:solidFill>
+              </a14:hiddenFill>
+            </a:ext>
+            <a:ext uri="{91240B29-F687-4F45-9708-019B960494DF}">
+              <a14:hiddenLine xmlns:a14="http://schemas.microsoft.com/office/drawing/2010/main" w="9525">
+                <a:solidFill>
+                  <a:srgbClr val="000000"/>
+                </a:solidFill>
+                <a:miter lim="800000"/>
+                <a:headEnd/>
+                <a:tailEnd/>
+              </a14:hiddenLine>
+            </a:ext>
+          </a:extLst>
+        </p:spPr>
+      </p:pic>
+      <p:sp>
+        <p:nvSpPr>
+          <p:cNvPr id="2" name="Title 1"/>
+          <p:cNvSpPr>
+            <a:spLocks noGrp="1"/>
+          </p:cNvSpPr>
+          <p:nvPr>
+            <p:ph type="title"/>
+          </p:nvPr>
+        </p:nvSpPr>
+        <p:spPr/>
+        <p:txBody>
+          <a:bodyPr/>
+          <a:lstStyle/>
+          <a:p>
+            <a:pPr algn="just"/>
+            <a:r>
+              <a:rPr lang="pt-BR" sz="2400" i="1" dirty="0" smtClean="0"/>
+              <a:t>GlobalRef</a:t>
+            </a:r>
+            <a:endParaRPr lang="pt-BR" i="1" dirty="0"/>
+          </a:p>
+        </p:txBody>
+      </p:sp>
+      <p:sp>
+        <p:nvSpPr>
+          <p:cNvPr id="3" name="Content Placeholder 2"/>
+          <p:cNvSpPr>
+            <a:spLocks noGrp="1"/>
+          </p:cNvSpPr>
+          <p:nvPr>
+            <p:ph idx="1"/>
+          </p:nvPr>
+        </p:nvSpPr>
+        <p:spPr/>
+        <p:txBody>
+          <a:bodyPr>
+            <a:noAutofit/>
+          </a:bodyPr>
+          <a:lstStyle/>
+          <a:p>
+            <a:pPr marL="0" indent="0">
+              <a:buNone/>
+            </a:pPr>
+            <a:endParaRPr lang="en-US" altLang="pt-BR" sz="1400" dirty="0" smtClean="0">
+              <a:solidFill>
+                <a:srgbClr val="910F93"/>
+              </a:solidFill>
+              <a:latin typeface="Monaco" charset="0"/>
+            </a:endParaRPr>
+          </a:p>
+          <a:p>
+            <a:pPr marL="0" indent="0">
+              <a:buNone/>
+            </a:pPr>
+            <a:endParaRPr lang="en-US" altLang="pt-BR" sz="1400" dirty="0">
+              <a:solidFill>
+                <a:srgbClr val="910F93"/>
+              </a:solidFill>
+              <a:latin typeface="Monaco" charset="0"/>
+            </a:endParaRPr>
+          </a:p>
+          <a:p>
+            <a:pPr marL="0" indent="0">
+              <a:buNone/>
+            </a:pPr>
+            <a:endParaRPr lang="en-US" altLang="pt-BR" sz="1400" dirty="0" smtClean="0">
+              <a:solidFill>
+                <a:srgbClr val="910F93"/>
+              </a:solidFill>
+              <a:latin typeface="Monaco" charset="0"/>
+            </a:endParaRPr>
+          </a:p>
+          <a:p>
+            <a:pPr marL="0" indent="0">
+              <a:buNone/>
+            </a:pPr>
+            <a:r>
+              <a:rPr lang="en-US" altLang="pt-BR" sz="1400" dirty="0" smtClean="0">
+                <a:solidFill>
+                  <a:srgbClr val="910F93"/>
+                </a:solidFill>
+                <a:latin typeface="Monaco" charset="0"/>
+              </a:rPr>
+              <a:t>class</a:t>
+            </a:r>
+            <a:r>
+              <a:rPr lang="en-US" altLang="pt-BR" sz="1400" dirty="0" smtClean="0">
+                <a:solidFill>
+                  <a:srgbClr val="000000"/>
+                </a:solidFill>
+                <a:latin typeface="Monaco" charset="0"/>
+              </a:rPr>
+              <a:t> </a:t>
+            </a:r>
+            <a:r>
+              <a:rPr lang="en-US" altLang="pt-BR" sz="1400" dirty="0">
+                <a:solidFill>
+                  <a:srgbClr val="000000"/>
+                </a:solidFill>
+                <a:latin typeface="Monaco" charset="0"/>
+              </a:rPr>
+              <a:t>Driver {</a:t>
+            </a:r>
+          </a:p>
+          <a:p>
+            <a:pPr marL="0" indent="0">
+              <a:buNone/>
+            </a:pPr>
+            <a:r>
+              <a:rPr lang="en-US" altLang="pt-BR" sz="1400" dirty="0">
+                <a:solidFill>
+                  <a:srgbClr val="000000"/>
+                </a:solidFill>
+                <a:latin typeface="Monaco" charset="0"/>
+              </a:rPr>
+              <a:t>  </a:t>
+            </a:r>
+            <a:r>
+              <a:rPr lang="en-US" altLang="pt-BR" sz="1400" dirty="0">
+                <a:solidFill>
+                  <a:srgbClr val="910F93"/>
+                </a:solidFill>
+                <a:latin typeface="Monaco" charset="0"/>
+              </a:rPr>
+              <a:t>public</a:t>
+            </a:r>
+            <a:r>
+              <a:rPr lang="en-US" altLang="pt-BR" sz="1400" dirty="0">
+                <a:solidFill>
+                  <a:srgbClr val="000000"/>
+                </a:solidFill>
+                <a:latin typeface="Monaco" charset="0"/>
+              </a:rPr>
+              <a:t> </a:t>
+            </a:r>
+            <a:r>
+              <a:rPr lang="en-US" altLang="pt-BR" sz="1400" dirty="0">
+                <a:solidFill>
+                  <a:srgbClr val="910F93"/>
+                </a:solidFill>
+                <a:latin typeface="Monaco" charset="0"/>
+              </a:rPr>
+              <a:t>static</a:t>
+            </a:r>
+            <a:r>
+              <a:rPr lang="en-US" altLang="pt-BR" sz="1400" dirty="0">
+                <a:solidFill>
+                  <a:srgbClr val="000000"/>
+                </a:solidFill>
+                <a:latin typeface="Monaco" charset="0"/>
+              </a:rPr>
+              <a:t> </a:t>
+            </a:r>
+            <a:r>
+              <a:rPr lang="en-US" altLang="pt-BR" sz="1400" dirty="0" err="1">
+                <a:solidFill>
+                  <a:srgbClr val="910F93"/>
+                </a:solidFill>
+                <a:latin typeface="Monaco" charset="0"/>
+              </a:rPr>
+              <a:t>def</a:t>
+            </a:r>
+            <a:r>
+              <a:rPr lang="en-US" altLang="pt-BR" sz="1400" dirty="0">
+                <a:solidFill>
+                  <a:srgbClr val="000000"/>
+                </a:solidFill>
+                <a:latin typeface="Monaco" charset="0"/>
+              </a:rPr>
+              <a:t> main(</a:t>
+            </a:r>
+            <a:r>
+              <a:rPr lang="en-US" altLang="pt-BR" sz="1400" dirty="0" err="1">
+                <a:solidFill>
+                  <a:srgbClr val="000000"/>
+                </a:solidFill>
+                <a:latin typeface="Monaco" charset="0"/>
+              </a:rPr>
+              <a:t>args:Array</a:t>
+            </a:r>
+            <a:r>
+              <a:rPr lang="en-US" altLang="pt-BR" sz="1400" dirty="0">
+                <a:solidFill>
+                  <a:srgbClr val="000000"/>
+                </a:solidFill>
+                <a:latin typeface="Monaco" charset="0"/>
+              </a:rPr>
+              <a:t>[String](1)):Void {</a:t>
+            </a:r>
+          </a:p>
+          <a:p>
+            <a:pPr marL="0" indent="0">
+              <a:buNone/>
+            </a:pPr>
+            <a:r>
+              <a:rPr lang="en-US" altLang="pt-BR" sz="1400" dirty="0">
+                <a:solidFill>
+                  <a:srgbClr val="000000"/>
+                </a:solidFill>
+                <a:latin typeface="Monaco" charset="0"/>
+              </a:rPr>
+              <a:t>    </a:t>
+            </a:r>
+            <a:r>
+              <a:rPr lang="en-US" altLang="pt-BR" sz="1400" dirty="0" err="1">
+                <a:solidFill>
+                  <a:srgbClr val="910F93"/>
+                </a:solidFill>
+                <a:latin typeface="Monaco" charset="0"/>
+              </a:rPr>
+              <a:t>val</a:t>
+            </a:r>
+            <a:r>
+              <a:rPr lang="en-US" altLang="pt-BR" sz="1400" dirty="0">
+                <a:solidFill>
+                  <a:srgbClr val="000000"/>
+                </a:solidFill>
+                <a:latin typeface="Monaco" charset="0"/>
+              </a:rPr>
+              <a:t> </a:t>
+            </a:r>
+            <a:r>
+              <a:rPr lang="en-US" altLang="pt-BR" sz="1400" dirty="0" err="1">
+                <a:solidFill>
+                  <a:srgbClr val="000000"/>
+                </a:solidFill>
+                <a:latin typeface="Monaco" charset="0"/>
+              </a:rPr>
+              <a:t>firstCounter</a:t>
+            </a:r>
+            <a:r>
+              <a:rPr lang="en-US" altLang="pt-BR" sz="1400" dirty="0">
+                <a:solidFill>
+                  <a:srgbClr val="000000"/>
+                </a:solidFill>
+                <a:latin typeface="Monaco" charset="0"/>
+              </a:rPr>
+              <a:t> = </a:t>
+            </a:r>
+            <a:r>
+              <a:rPr lang="en-US" altLang="pt-BR" sz="1400" dirty="0">
+                <a:solidFill>
+                  <a:srgbClr val="910F93"/>
+                </a:solidFill>
+                <a:latin typeface="Monaco" charset="0"/>
+              </a:rPr>
+              <a:t>new</a:t>
+            </a:r>
+            <a:r>
+              <a:rPr lang="en-US" altLang="pt-BR" sz="1400" dirty="0">
+                <a:solidFill>
+                  <a:srgbClr val="000000"/>
+                </a:solidFill>
+                <a:latin typeface="Monaco" charset="0"/>
+              </a:rPr>
+              <a:t> Counter();</a:t>
+            </a:r>
+          </a:p>
+          <a:p>
+            <a:pPr marL="0" indent="0">
+              <a:buNone/>
+            </a:pPr>
+            <a:r>
+              <a:rPr lang="en-US" altLang="pt-BR" sz="1400" dirty="0">
+                <a:solidFill>
+                  <a:srgbClr val="000000"/>
+                </a:solidFill>
+                <a:latin typeface="Monaco" charset="0"/>
+              </a:rPr>
+              <a:t>    </a:t>
+            </a:r>
+            <a:r>
+              <a:rPr lang="en-US" altLang="pt-BR" sz="1400" dirty="0" err="1">
+                <a:solidFill>
+                  <a:srgbClr val="910F93"/>
+                </a:solidFill>
+                <a:latin typeface="Monaco" charset="0"/>
+              </a:rPr>
+              <a:t>val</a:t>
+            </a:r>
+            <a:r>
+              <a:rPr lang="en-US" altLang="pt-BR" sz="1400" dirty="0">
+                <a:solidFill>
+                  <a:srgbClr val="000000"/>
+                </a:solidFill>
+                <a:latin typeface="Monaco" charset="0"/>
+              </a:rPr>
+              <a:t> </a:t>
+            </a:r>
+            <a:r>
+              <a:rPr lang="en-US" altLang="pt-BR" sz="1400" dirty="0" err="1">
+                <a:solidFill>
+                  <a:srgbClr val="000000"/>
+                </a:solidFill>
+                <a:latin typeface="Monaco" charset="0"/>
+              </a:rPr>
+              <a:t>secondCounter</a:t>
+            </a:r>
+            <a:r>
+              <a:rPr lang="en-US" altLang="pt-BR" sz="1400" dirty="0">
+                <a:solidFill>
+                  <a:srgbClr val="000000"/>
+                </a:solidFill>
+                <a:latin typeface="Monaco" charset="0"/>
+              </a:rPr>
+              <a:t> = </a:t>
+            </a:r>
+            <a:r>
+              <a:rPr lang="en-US" altLang="pt-BR" sz="1400" dirty="0">
+                <a:solidFill>
+                  <a:srgbClr val="910F93"/>
+                </a:solidFill>
+                <a:latin typeface="Monaco" charset="0"/>
+              </a:rPr>
+              <a:t>new</a:t>
+            </a:r>
+            <a:r>
+              <a:rPr lang="en-US" altLang="pt-BR" sz="1400" dirty="0">
+                <a:solidFill>
+                  <a:srgbClr val="000000"/>
+                </a:solidFill>
+                <a:latin typeface="Monaco" charset="0"/>
+              </a:rPr>
+              <a:t> Counter(</a:t>
+            </a:r>
+            <a:r>
+              <a:rPr lang="en-US" altLang="pt-BR" sz="1400" dirty="0">
+                <a:solidFill>
+                  <a:srgbClr val="909200"/>
+                </a:solidFill>
+                <a:latin typeface="Monaco" charset="0"/>
+              </a:rPr>
+              <a:t>5</a:t>
+            </a:r>
+            <a:r>
+              <a:rPr lang="en-US" altLang="pt-BR" sz="1400" dirty="0">
+                <a:solidFill>
+                  <a:srgbClr val="000000"/>
+                </a:solidFill>
+                <a:latin typeface="Monaco" charset="0"/>
+              </a:rPr>
+              <a:t>);</a:t>
+            </a:r>
+          </a:p>
+          <a:p>
+            <a:pPr marL="0" indent="0">
+              <a:buNone/>
+            </a:pPr>
+            <a:r>
+              <a:rPr lang="en-US" altLang="pt-BR" sz="1400" dirty="0">
+                <a:solidFill>
+                  <a:srgbClr val="000000"/>
+                </a:solidFill>
+                <a:latin typeface="Monaco" charset="0"/>
+              </a:rPr>
+              <a:t>    </a:t>
+            </a:r>
+            <a:r>
+              <a:rPr lang="en-US" altLang="pt-BR" sz="1400" dirty="0">
+                <a:solidFill>
+                  <a:srgbClr val="910F93"/>
+                </a:solidFill>
+                <a:latin typeface="Monaco" charset="0"/>
+              </a:rPr>
+              <a:t>for</a:t>
+            </a:r>
+            <a:r>
+              <a:rPr lang="en-US" altLang="pt-BR" sz="1400" dirty="0">
+                <a:solidFill>
+                  <a:srgbClr val="000000"/>
+                </a:solidFill>
+                <a:latin typeface="Monaco" charset="0"/>
+              </a:rPr>
+              <a:t> (</a:t>
+            </a:r>
+            <a:r>
+              <a:rPr lang="en-US" altLang="pt-BR" sz="1400" dirty="0" err="1">
+                <a:solidFill>
+                  <a:srgbClr val="910F93"/>
+                </a:solidFill>
+                <a:latin typeface="Monaco" charset="0"/>
+              </a:rPr>
+              <a:t>var</a:t>
+            </a:r>
+            <a:r>
+              <a:rPr lang="en-US" altLang="pt-BR" sz="1400" dirty="0">
+                <a:solidFill>
+                  <a:srgbClr val="000000"/>
+                </a:solidFill>
+                <a:latin typeface="Monaco" charset="0"/>
+              </a:rPr>
+              <a:t> i:Int=</a:t>
+            </a:r>
+            <a:r>
+              <a:rPr lang="en-US" altLang="pt-BR" sz="1400" dirty="0">
+                <a:solidFill>
+                  <a:srgbClr val="909200"/>
+                </a:solidFill>
+                <a:latin typeface="Monaco" charset="0"/>
+              </a:rPr>
+              <a:t>0</a:t>
+            </a:r>
+            <a:r>
+              <a:rPr lang="en-US" altLang="pt-BR" sz="1400" dirty="0">
+                <a:solidFill>
+                  <a:srgbClr val="000000"/>
+                </a:solidFill>
+                <a:latin typeface="Monaco" charset="0"/>
+              </a:rPr>
+              <a:t>; </a:t>
+            </a:r>
+            <a:r>
+              <a:rPr lang="en-US" altLang="pt-BR" sz="1400" dirty="0" err="1">
+                <a:solidFill>
+                  <a:srgbClr val="000000"/>
+                </a:solidFill>
+                <a:latin typeface="Monaco" charset="0"/>
+              </a:rPr>
+              <a:t>i</a:t>
+            </a:r>
+            <a:r>
+              <a:rPr lang="en-US" altLang="pt-BR" sz="1400" dirty="0">
+                <a:solidFill>
+                  <a:srgbClr val="000000"/>
+                </a:solidFill>
+                <a:latin typeface="Monaco" charset="0"/>
+              </a:rPr>
+              <a:t>&lt;</a:t>
+            </a:r>
+            <a:r>
+              <a:rPr lang="en-US" altLang="pt-BR" sz="1400" dirty="0">
+                <a:solidFill>
+                  <a:srgbClr val="909200"/>
+                </a:solidFill>
+                <a:latin typeface="Monaco" charset="0"/>
+              </a:rPr>
+              <a:t>10</a:t>
+            </a:r>
+            <a:r>
+              <a:rPr lang="en-US" altLang="pt-BR" sz="1400" dirty="0">
+                <a:solidFill>
+                  <a:srgbClr val="000000"/>
+                </a:solidFill>
+                <a:latin typeface="Monaco" charset="0"/>
+              </a:rPr>
+              <a:t>; </a:t>
+            </a:r>
+            <a:r>
+              <a:rPr lang="en-US" altLang="pt-BR" sz="1400" dirty="0" err="1">
+                <a:solidFill>
+                  <a:srgbClr val="000000"/>
+                </a:solidFill>
+                <a:latin typeface="Monaco" charset="0"/>
+              </a:rPr>
+              <a:t>i</a:t>
+            </a:r>
+            <a:r>
+              <a:rPr lang="en-US" altLang="pt-BR" sz="1400" dirty="0">
+                <a:solidFill>
+                  <a:srgbClr val="000000"/>
+                </a:solidFill>
+                <a:latin typeface="Monaco" charset="0"/>
+              </a:rPr>
+              <a:t>++) {</a:t>
+            </a:r>
+          </a:p>
+          <a:p>
+            <a:pPr marL="0" indent="0">
+              <a:buNone/>
+            </a:pPr>
+            <a:r>
+              <a:rPr lang="en-US" altLang="pt-BR" sz="1400" dirty="0">
+                <a:solidFill>
+                  <a:srgbClr val="000000"/>
+                </a:solidFill>
+                <a:latin typeface="Monaco" charset="0"/>
+              </a:rPr>
+              <a:t>      </a:t>
+            </a:r>
+            <a:r>
+              <a:rPr lang="en-US" altLang="pt-BR" sz="1400" dirty="0" err="1">
+                <a:solidFill>
+                  <a:srgbClr val="000000"/>
+                </a:solidFill>
+                <a:latin typeface="Monaco" charset="0"/>
+              </a:rPr>
+              <a:t>firstCounter.count</a:t>
+            </a:r>
+            <a:r>
+              <a:rPr lang="en-US" altLang="pt-BR" sz="1400" dirty="0">
+                <a:solidFill>
+                  <a:srgbClr val="000000"/>
+                </a:solidFill>
+                <a:latin typeface="Monaco" charset="0"/>
+              </a:rPr>
+              <a:t>();</a:t>
+            </a:r>
+          </a:p>
+          <a:p>
+            <a:pPr marL="0" indent="0">
+              <a:buNone/>
+            </a:pPr>
+            <a:r>
+              <a:rPr lang="en-US" altLang="pt-BR" sz="1400" dirty="0">
+                <a:solidFill>
+                  <a:srgbClr val="000000"/>
+                </a:solidFill>
+                <a:latin typeface="Monaco" charset="0"/>
+              </a:rPr>
+              <a:t>      </a:t>
+            </a:r>
+            <a:r>
+              <a:rPr lang="en-US" altLang="pt-BR" sz="1400" dirty="0" err="1">
+                <a:solidFill>
+                  <a:srgbClr val="000000"/>
+                </a:solidFill>
+                <a:latin typeface="Monaco" charset="0"/>
+              </a:rPr>
+              <a:t>secondCounter.count</a:t>
+            </a:r>
+            <a:r>
+              <a:rPr lang="en-US" altLang="pt-BR" sz="1400" dirty="0">
+                <a:solidFill>
+                  <a:srgbClr val="000000"/>
+                </a:solidFill>
+                <a:latin typeface="Monaco" charset="0"/>
+              </a:rPr>
+              <a:t>();</a:t>
+            </a:r>
+          </a:p>
+          <a:p>
+            <a:pPr marL="0" indent="0">
+              <a:buNone/>
+            </a:pPr>
+            <a:r>
+              <a:rPr lang="en-US" altLang="pt-BR" sz="1400" dirty="0">
+                <a:solidFill>
+                  <a:srgbClr val="000000"/>
+                </a:solidFill>
+                <a:latin typeface="Monaco" charset="0"/>
+              </a:rPr>
+              <a:t>    }</a:t>
+            </a:r>
+          </a:p>
+          <a:p>
+            <a:pPr marL="0" indent="0">
+              <a:buNone/>
+            </a:pPr>
+            <a:r>
+              <a:rPr lang="en-US" altLang="pt-BR" sz="1400" dirty="0">
+                <a:solidFill>
+                  <a:srgbClr val="000000"/>
+                </a:solidFill>
+                <a:latin typeface="Monaco" charset="0"/>
+              </a:rPr>
+              <a:t>    </a:t>
+            </a:r>
+            <a:r>
+              <a:rPr lang="en-US" altLang="pt-BR" sz="1400" dirty="0" err="1">
+                <a:solidFill>
+                  <a:srgbClr val="910F93"/>
+                </a:solidFill>
+                <a:latin typeface="Monaco" charset="0"/>
+              </a:rPr>
+              <a:t>val</a:t>
+            </a:r>
+            <a:r>
+              <a:rPr lang="en-US" altLang="pt-BR" sz="1400" dirty="0">
+                <a:solidFill>
+                  <a:srgbClr val="000000"/>
+                </a:solidFill>
+                <a:latin typeface="Monaco" charset="0"/>
+              </a:rPr>
+              <a:t> </a:t>
+            </a:r>
+            <a:r>
+              <a:rPr lang="en-US" altLang="pt-BR" sz="1400" dirty="0" err="1">
+                <a:solidFill>
+                  <a:srgbClr val="000000"/>
+                </a:solidFill>
+                <a:latin typeface="Monaco" charset="0"/>
+              </a:rPr>
+              <a:t>firstValue</a:t>
+            </a:r>
+            <a:r>
+              <a:rPr lang="en-US" altLang="pt-BR" sz="1400" dirty="0">
+                <a:solidFill>
+                  <a:srgbClr val="000000"/>
+                </a:solidFill>
+                <a:latin typeface="Monaco" charset="0"/>
+              </a:rPr>
+              <a:t> = </a:t>
+            </a:r>
+            <a:r>
+              <a:rPr lang="en-US" altLang="pt-BR" sz="1400" dirty="0" err="1">
+                <a:solidFill>
+                  <a:srgbClr val="000000"/>
+                </a:solidFill>
+                <a:latin typeface="Monaco" charset="0"/>
+              </a:rPr>
+              <a:t>firstCounter.getCount</a:t>
+            </a:r>
+            <a:r>
+              <a:rPr lang="en-US" altLang="pt-BR" sz="1400" dirty="0">
+                <a:solidFill>
+                  <a:srgbClr val="000000"/>
+                </a:solidFill>
+                <a:latin typeface="Monaco" charset="0"/>
+              </a:rPr>
+              <a:t>();</a:t>
+            </a:r>
+          </a:p>
+          <a:p>
+            <a:pPr marL="0" indent="0">
+              <a:buNone/>
+            </a:pPr>
+            <a:r>
+              <a:rPr lang="en-US" altLang="pt-BR" sz="1400" dirty="0">
+                <a:solidFill>
+                  <a:srgbClr val="000000"/>
+                </a:solidFill>
+                <a:latin typeface="Monaco" charset="0"/>
+              </a:rPr>
+              <a:t>    </a:t>
+            </a:r>
+            <a:r>
+              <a:rPr lang="en-US" altLang="pt-BR" sz="1400" dirty="0" err="1">
+                <a:solidFill>
+                  <a:srgbClr val="910F93"/>
+                </a:solidFill>
+                <a:latin typeface="Monaco" charset="0"/>
+              </a:rPr>
+              <a:t>val</a:t>
+            </a:r>
+            <a:r>
+              <a:rPr lang="en-US" altLang="pt-BR" sz="1400" dirty="0">
+                <a:solidFill>
+                  <a:srgbClr val="000000"/>
+                </a:solidFill>
+                <a:latin typeface="Monaco" charset="0"/>
+              </a:rPr>
+              <a:t> </a:t>
+            </a:r>
+            <a:r>
+              <a:rPr lang="en-US" altLang="pt-BR" sz="1400" dirty="0" err="1">
+                <a:solidFill>
+                  <a:srgbClr val="000000"/>
+                </a:solidFill>
+                <a:latin typeface="Monaco" charset="0"/>
+              </a:rPr>
+              <a:t>secondValue</a:t>
+            </a:r>
+            <a:r>
+              <a:rPr lang="en-US" altLang="pt-BR" sz="1400" dirty="0">
+                <a:solidFill>
+                  <a:srgbClr val="000000"/>
+                </a:solidFill>
+                <a:latin typeface="Monaco" charset="0"/>
+              </a:rPr>
+              <a:t> = </a:t>
+            </a:r>
+            <a:r>
+              <a:rPr lang="en-US" altLang="pt-BR" sz="1400" dirty="0" err="1">
+                <a:solidFill>
+                  <a:srgbClr val="000000"/>
+                </a:solidFill>
+                <a:latin typeface="Monaco" charset="0"/>
+              </a:rPr>
+              <a:t>secondCounter.getCount</a:t>
+            </a:r>
+            <a:r>
+              <a:rPr lang="en-US" altLang="pt-BR" sz="1400" dirty="0">
+                <a:solidFill>
+                  <a:srgbClr val="000000"/>
+                </a:solidFill>
+                <a:latin typeface="Monaco" charset="0"/>
+              </a:rPr>
+              <a:t>();</a:t>
+            </a:r>
+          </a:p>
+          <a:p>
+            <a:pPr marL="0" indent="0">
+              <a:buNone/>
+            </a:pPr>
+            <a:r>
+              <a:rPr lang="en-US" altLang="pt-BR" sz="1400" dirty="0">
+                <a:solidFill>
+                  <a:srgbClr val="000000"/>
+                </a:solidFill>
+                <a:latin typeface="Monaco" charset="0"/>
+              </a:rPr>
+              <a:t>    </a:t>
+            </a:r>
+            <a:r>
+              <a:rPr lang="en-US" altLang="pt-BR" sz="1400" dirty="0" err="1">
+                <a:solidFill>
+                  <a:srgbClr val="000000"/>
+                </a:solidFill>
+                <a:latin typeface="Monaco" charset="0"/>
+              </a:rPr>
+              <a:t>Console.OUT.println</a:t>
+            </a:r>
+            <a:r>
+              <a:rPr lang="en-US" altLang="pt-BR" sz="1400" dirty="0">
+                <a:solidFill>
+                  <a:srgbClr val="000000"/>
+                </a:solidFill>
+                <a:latin typeface="Monaco" charset="0"/>
+              </a:rPr>
+              <a:t>(</a:t>
+            </a:r>
+            <a:r>
+              <a:rPr lang="en-US" altLang="pt-BR" sz="1400" dirty="0">
+                <a:solidFill>
+                  <a:srgbClr val="190492"/>
+                </a:solidFill>
+                <a:latin typeface="Monaco" charset="0"/>
+              </a:rPr>
+              <a:t>"First value = "</a:t>
+            </a:r>
+            <a:r>
+              <a:rPr lang="en-US" altLang="pt-BR" sz="1400" dirty="0">
+                <a:solidFill>
+                  <a:srgbClr val="000000"/>
+                </a:solidFill>
+                <a:latin typeface="Monaco" charset="0"/>
+              </a:rPr>
+              <a:t>+</a:t>
+            </a:r>
+            <a:r>
+              <a:rPr lang="en-US" altLang="pt-BR" sz="1400" dirty="0" err="1">
+                <a:solidFill>
+                  <a:srgbClr val="000000"/>
+                </a:solidFill>
+                <a:latin typeface="Monaco" charset="0"/>
+              </a:rPr>
+              <a:t>firstValue</a:t>
+            </a:r>
+            <a:r>
+              <a:rPr lang="en-US" altLang="pt-BR" sz="1400" dirty="0">
+                <a:solidFill>
+                  <a:srgbClr val="000000"/>
+                </a:solidFill>
+                <a:latin typeface="Monaco" charset="0"/>
+              </a:rPr>
+              <a:t>);</a:t>
+            </a:r>
+          </a:p>
+          <a:p>
+            <a:pPr marL="0" indent="0">
+              <a:buNone/>
+            </a:pPr>
+            <a:r>
+              <a:rPr lang="en-US" altLang="pt-BR" sz="1400" dirty="0">
+                <a:solidFill>
+                  <a:srgbClr val="000000"/>
+                </a:solidFill>
+                <a:latin typeface="Monaco" charset="0"/>
+              </a:rPr>
+              <a:t>    </a:t>
+            </a:r>
+            <a:r>
+              <a:rPr lang="en-US" altLang="pt-BR" sz="1400" dirty="0" err="1">
+                <a:solidFill>
+                  <a:srgbClr val="000000"/>
+                </a:solidFill>
+                <a:latin typeface="Monaco" charset="0"/>
+              </a:rPr>
+              <a:t>Console.OUT.println</a:t>
+            </a:r>
+            <a:r>
+              <a:rPr lang="en-US" altLang="pt-BR" sz="1400" dirty="0">
+                <a:solidFill>
+                  <a:srgbClr val="000000"/>
+                </a:solidFill>
+                <a:latin typeface="Monaco" charset="0"/>
+              </a:rPr>
+              <a:t>(</a:t>
+            </a:r>
+            <a:r>
+              <a:rPr lang="en-US" altLang="pt-BR" sz="1400" dirty="0">
+                <a:solidFill>
+                  <a:srgbClr val="190492"/>
+                </a:solidFill>
+                <a:latin typeface="Monaco" charset="0"/>
+              </a:rPr>
+              <a:t>"Second value = "</a:t>
+            </a:r>
+            <a:r>
+              <a:rPr lang="en-US" altLang="pt-BR" sz="1400" dirty="0">
+                <a:solidFill>
+                  <a:srgbClr val="000000"/>
+                </a:solidFill>
+                <a:latin typeface="Monaco" charset="0"/>
+              </a:rPr>
+              <a:t>+</a:t>
+            </a:r>
+            <a:r>
+              <a:rPr lang="en-US" altLang="pt-BR" sz="1400" dirty="0" err="1">
+                <a:solidFill>
+                  <a:srgbClr val="000000"/>
+                </a:solidFill>
+                <a:latin typeface="Monaco" charset="0"/>
+              </a:rPr>
+              <a:t>secondValue</a:t>
+            </a:r>
+            <a:r>
+              <a:rPr lang="en-US" altLang="pt-BR" sz="1400" dirty="0">
+                <a:solidFill>
+                  <a:srgbClr val="000000"/>
+                </a:solidFill>
+                <a:latin typeface="Monaco" charset="0"/>
+              </a:rPr>
+              <a:t>);</a:t>
+            </a:r>
+          </a:p>
+          <a:p>
+            <a:pPr marL="0" indent="0">
+              <a:buNone/>
+            </a:pPr>
+            <a:r>
+              <a:rPr lang="en-US" altLang="pt-BR" sz="1400" dirty="0">
+                <a:solidFill>
+                  <a:srgbClr val="000000"/>
+                </a:solidFill>
+                <a:latin typeface="Monaco" charset="0"/>
+              </a:rPr>
+              <a:t>  }</a:t>
+            </a:r>
+          </a:p>
+          <a:p>
+            <a:pPr marL="0" indent="0">
+              <a:buNone/>
+            </a:pPr>
+            <a:r>
+              <a:rPr lang="en-US" altLang="pt-BR" sz="1400" dirty="0">
+                <a:solidFill>
+                  <a:srgbClr val="000000"/>
+                </a:solidFill>
+                <a:latin typeface="Monaco" charset="0"/>
+              </a:rPr>
+              <a:t>}</a:t>
+            </a:r>
+            <a:endParaRPr lang="en-US" altLang="pt-BR" sz="1400" dirty="0"/>
+          </a:p>
+          <a:p>
+            <a:endParaRPr lang="pt-BR" sz="1200" dirty="0"/>
           </a:p>
         </p:txBody>
       </p:sp>
@@ -3817,7 +5242,817 @@
 </p:sld>
 </file>
 
-<file path=ppt/slides/slide12.xml><?xml version="1.0" encoding="utf-8"?>
+<file path=ppt/slides/slide14.xml><?xml version="1.0" encoding="utf-8"?>
+<p:sld xmlns:a="http://schemas.openxmlformats.org/drawingml/2006/main" xmlns:r="http://schemas.openxmlformats.org/officeDocument/2006/relationships" xmlns:p="http://schemas.openxmlformats.org/presentationml/2006/main">
+  <p:cSld>
+    <p:spTree>
+      <p:nvGrpSpPr>
+        <p:cNvPr id="1" name=""/>
+        <p:cNvGrpSpPr/>
+        <p:nvPr/>
+      </p:nvGrpSpPr>
+      <p:grpSpPr>
+        <a:xfrm>
+          <a:off x="0" y="0"/>
+          <a:ext cx="0" cy="0"/>
+          <a:chOff x="0" y="0"/>
+          <a:chExt cx="0" cy="0"/>
+        </a:xfrm>
+      </p:grpSpPr>
+      <p:pic>
+        <p:nvPicPr>
+          <p:cNvPr id="6" name="Picture 8" descr="objects-in-place.eps"/>
+          <p:cNvPicPr>
+            <a:picLocks noChangeAspect="1"/>
+          </p:cNvPicPr>
+          <p:nvPr/>
+        </p:nvPicPr>
+        <p:blipFill>
+          <a:blip r:embed="rId2" cstate="print">
+            <a:extLst>
+              <a:ext uri="{28A0092B-C50C-407E-A947-70E740481C1C}">
+                <a14:useLocalDpi xmlns:a14="http://schemas.microsoft.com/office/drawing/2010/main" val="0"/>
+              </a:ext>
+            </a:extLst>
+          </a:blip>
+          <a:srcRect/>
+          <a:stretch>
+            <a:fillRect/>
+          </a:stretch>
+        </p:blipFill>
+        <p:spPr bwMode="auto">
+          <a:xfrm>
+            <a:off x="5648325" y="2482850"/>
+            <a:ext cx="3495675" cy="4375150"/>
+          </a:xfrm>
+          <a:prstGeom prst="rect">
+            <a:avLst/>
+          </a:prstGeom>
+          <a:noFill/>
+          <a:ln>
+            <a:noFill/>
+          </a:ln>
+          <a:extLst>
+            <a:ext uri="{909E8E84-426E-40DD-AFC4-6F175D3DCCD1}">
+              <a14:hiddenFill xmlns:a14="http://schemas.microsoft.com/office/drawing/2010/main">
+                <a:solidFill>
+                  <a:srgbClr val="FFFFFF"/>
+                </a:solidFill>
+              </a14:hiddenFill>
+            </a:ext>
+            <a:ext uri="{91240B29-F687-4F45-9708-019B960494DF}">
+              <a14:hiddenLine xmlns:a14="http://schemas.microsoft.com/office/drawing/2010/main" w="9525">
+                <a:solidFill>
+                  <a:srgbClr val="000000"/>
+                </a:solidFill>
+                <a:miter lim="800000"/>
+                <a:headEnd/>
+                <a:tailEnd/>
+              </a14:hiddenLine>
+            </a:ext>
+          </a:extLst>
+        </p:spPr>
+      </p:pic>
+      <p:sp>
+        <p:nvSpPr>
+          <p:cNvPr id="2" name="Title 1"/>
+          <p:cNvSpPr>
+            <a:spLocks noGrp="1"/>
+          </p:cNvSpPr>
+          <p:nvPr>
+            <p:ph type="title"/>
+          </p:nvPr>
+        </p:nvSpPr>
+        <p:spPr/>
+        <p:txBody>
+          <a:bodyPr/>
+          <a:lstStyle/>
+          <a:p>
+            <a:pPr algn="just"/>
+            <a:r>
+              <a:rPr lang="pt-BR" sz="2400" i="1" dirty="0" smtClean="0"/>
+              <a:t>GlobalRef</a:t>
+            </a:r>
+            <a:endParaRPr lang="pt-BR" i="1" dirty="0"/>
+          </a:p>
+        </p:txBody>
+      </p:sp>
+      <p:sp>
+        <p:nvSpPr>
+          <p:cNvPr id="3" name="Content Placeholder 2"/>
+          <p:cNvSpPr>
+            <a:spLocks noGrp="1"/>
+          </p:cNvSpPr>
+          <p:nvPr>
+            <p:ph idx="1"/>
+          </p:nvPr>
+        </p:nvSpPr>
+        <p:spPr/>
+        <p:txBody>
+          <a:bodyPr>
+            <a:noAutofit/>
+          </a:bodyPr>
+          <a:lstStyle/>
+          <a:p>
+            <a:pPr marL="0" indent="0">
+              <a:buNone/>
+            </a:pPr>
+            <a:r>
+              <a:rPr lang="en-US" altLang="pt-BR" sz="1400" dirty="0" smtClean="0">
+                <a:solidFill>
+                  <a:srgbClr val="8F1493"/>
+                </a:solidFill>
+                <a:latin typeface="Monaco" charset="0"/>
+              </a:rPr>
+              <a:t>public</a:t>
+            </a:r>
+            <a:r>
+              <a:rPr lang="en-US" altLang="pt-BR" sz="1400" dirty="0" smtClean="0">
+                <a:solidFill>
+                  <a:srgbClr val="000000"/>
+                </a:solidFill>
+                <a:latin typeface="Monaco" charset="0"/>
+              </a:rPr>
+              <a:t> </a:t>
+            </a:r>
+            <a:r>
+              <a:rPr lang="en-US" altLang="pt-BR" sz="1400" dirty="0">
+                <a:solidFill>
+                  <a:srgbClr val="8F1493"/>
+                </a:solidFill>
+                <a:latin typeface="Monaco" charset="0"/>
+              </a:rPr>
+              <a:t>static</a:t>
+            </a:r>
+            <a:r>
+              <a:rPr lang="en-US" altLang="pt-BR" sz="1400" dirty="0">
+                <a:solidFill>
+                  <a:srgbClr val="000000"/>
+                </a:solidFill>
+                <a:latin typeface="Monaco" charset="0"/>
+              </a:rPr>
+              <a:t> </a:t>
+            </a:r>
+            <a:r>
+              <a:rPr lang="en-US" altLang="pt-BR" sz="1400" dirty="0" err="1">
+                <a:solidFill>
+                  <a:srgbClr val="8F1493"/>
+                </a:solidFill>
+                <a:latin typeface="Monaco" charset="0"/>
+              </a:rPr>
+              <a:t>def</a:t>
+            </a:r>
+            <a:r>
+              <a:rPr lang="en-US" altLang="pt-BR" sz="1400" dirty="0">
+                <a:solidFill>
+                  <a:srgbClr val="000000"/>
+                </a:solidFill>
+                <a:latin typeface="Monaco" charset="0"/>
+              </a:rPr>
+              <a:t> main(</a:t>
+            </a:r>
+            <a:r>
+              <a:rPr lang="en-US" altLang="pt-BR" sz="1400" dirty="0" err="1">
+                <a:solidFill>
+                  <a:srgbClr val="000000"/>
+                </a:solidFill>
+                <a:latin typeface="Monaco" charset="0"/>
+              </a:rPr>
+              <a:t>args:Array</a:t>
+            </a:r>
+            <a:r>
+              <a:rPr lang="en-US" altLang="pt-BR" sz="1400" dirty="0">
+                <a:solidFill>
+                  <a:srgbClr val="000000"/>
+                </a:solidFill>
+                <a:latin typeface="Monaco" charset="0"/>
+              </a:rPr>
+              <a:t>[String](1)):Void {</a:t>
+            </a:r>
+          </a:p>
+          <a:p>
+            <a:pPr marL="0" indent="0">
+              <a:buNone/>
+            </a:pPr>
+            <a:r>
+              <a:rPr lang="en-US" altLang="pt-BR" sz="1400" dirty="0">
+                <a:solidFill>
+                  <a:srgbClr val="8F1493"/>
+                </a:solidFill>
+                <a:latin typeface="Monaco" charset="0"/>
+              </a:rPr>
+              <a:t>  </a:t>
+            </a:r>
+            <a:r>
+              <a:rPr lang="en-US" altLang="pt-BR" sz="1400" dirty="0" err="1">
+                <a:solidFill>
+                  <a:srgbClr val="8F1493"/>
+                </a:solidFill>
+                <a:latin typeface="Monaco" charset="0"/>
+              </a:rPr>
+              <a:t>val</a:t>
+            </a:r>
+            <a:r>
+              <a:rPr lang="en-US" altLang="pt-BR" sz="1400" dirty="0">
+                <a:solidFill>
+                  <a:srgbClr val="000000"/>
+                </a:solidFill>
+                <a:latin typeface="Monaco" charset="0"/>
+              </a:rPr>
+              <a:t> </a:t>
+            </a:r>
+            <a:r>
+              <a:rPr lang="en-US" altLang="pt-BR" sz="1400" dirty="0" err="1">
+                <a:solidFill>
+                  <a:srgbClr val="000000"/>
+                </a:solidFill>
+                <a:latin typeface="Monaco" charset="0"/>
+              </a:rPr>
+              <a:t>secondCtr</a:t>
+            </a:r>
+            <a:r>
+              <a:rPr lang="en-US" altLang="pt-BR" sz="1400" dirty="0">
+                <a:solidFill>
+                  <a:srgbClr val="000000"/>
+                </a:solidFill>
+                <a:latin typeface="Monaco" charset="0"/>
+              </a:rPr>
+              <a:t> = (</a:t>
+            </a:r>
+            <a:r>
+              <a:rPr lang="en-US" altLang="pt-BR" sz="1400" dirty="0">
+                <a:solidFill>
+                  <a:srgbClr val="8F1493"/>
+                </a:solidFill>
+                <a:latin typeface="Monaco" charset="0"/>
+              </a:rPr>
+              <a:t>at</a:t>
+            </a:r>
+            <a:r>
+              <a:rPr lang="en-US" altLang="pt-BR" sz="1400" dirty="0">
+                <a:solidFill>
+                  <a:srgbClr val="000000"/>
+                </a:solidFill>
+                <a:latin typeface="Monaco" charset="0"/>
+              </a:rPr>
+              <a:t> (</a:t>
+            </a:r>
+            <a:r>
+              <a:rPr lang="en-US" altLang="pt-BR" sz="1400" dirty="0" err="1">
+                <a:solidFill>
+                  <a:srgbClr val="000000"/>
+                </a:solidFill>
+                <a:latin typeface="Monaco" charset="0"/>
+              </a:rPr>
+              <a:t>Place.places</a:t>
+            </a:r>
+            <a:r>
+              <a:rPr lang="en-US" altLang="pt-BR" sz="1400" dirty="0">
+                <a:solidFill>
+                  <a:srgbClr val="000000"/>
+                </a:solidFill>
+                <a:latin typeface="Monaco" charset="0"/>
+              </a:rPr>
+              <a:t>(</a:t>
+            </a:r>
+            <a:r>
+              <a:rPr lang="en-US" altLang="pt-BR" sz="1400" dirty="0">
+                <a:solidFill>
+                  <a:srgbClr val="929200"/>
+                </a:solidFill>
+                <a:latin typeface="Monaco" charset="0"/>
+              </a:rPr>
+              <a:t>1</a:t>
+            </a:r>
+            <a:r>
+              <a:rPr lang="en-US" altLang="pt-BR" sz="1400" dirty="0">
+                <a:solidFill>
+                  <a:srgbClr val="000000"/>
+                </a:solidFill>
+                <a:latin typeface="Monaco" charset="0"/>
+              </a:rPr>
+              <a:t>)) </a:t>
+            </a:r>
+            <a:r>
+              <a:rPr lang="en-US" altLang="pt-BR" sz="1400" dirty="0" err="1">
+                <a:solidFill>
+                  <a:srgbClr val="000000"/>
+                </a:solidFill>
+                <a:latin typeface="Monaco" charset="0"/>
+              </a:rPr>
+              <a:t>GlobalRef</a:t>
+            </a:r>
+            <a:r>
+              <a:rPr lang="en-US" altLang="pt-BR" sz="1400" dirty="0">
+                <a:solidFill>
+                  <a:srgbClr val="000000"/>
+                </a:solidFill>
+                <a:latin typeface="Monaco" charset="0"/>
+              </a:rPr>
+              <a:t>[Counter](</a:t>
+            </a:r>
+            <a:r>
+              <a:rPr lang="en-US" altLang="pt-BR" sz="1400" dirty="0">
+                <a:solidFill>
+                  <a:srgbClr val="8F1493"/>
+                </a:solidFill>
+                <a:latin typeface="Monaco" charset="0"/>
+              </a:rPr>
+              <a:t>new</a:t>
+            </a:r>
+            <a:r>
+              <a:rPr lang="en-US" altLang="pt-BR" sz="1400" dirty="0">
+                <a:solidFill>
+                  <a:srgbClr val="000000"/>
+                </a:solidFill>
+                <a:latin typeface="Monaco" charset="0"/>
+              </a:rPr>
+              <a:t> Counter(</a:t>
+            </a:r>
+            <a:r>
+              <a:rPr lang="en-US" altLang="pt-BR" sz="1400" dirty="0">
+                <a:solidFill>
+                  <a:srgbClr val="929200"/>
+                </a:solidFill>
+                <a:latin typeface="Monaco" charset="0"/>
+              </a:rPr>
+              <a:t>5</a:t>
+            </a:r>
+            <a:r>
+              <a:rPr lang="en-US" altLang="pt-BR" sz="1400" dirty="0">
+                <a:solidFill>
+                  <a:srgbClr val="000000"/>
+                </a:solidFill>
+                <a:latin typeface="Monaco" charset="0"/>
+              </a:rPr>
+              <a:t>)));</a:t>
+            </a:r>
+          </a:p>
+          <a:p>
+            <a:pPr marL="0" indent="0">
+              <a:buNone/>
+            </a:pPr>
+            <a:r>
+              <a:rPr lang="en-US" altLang="pt-BR" sz="1400" dirty="0">
+                <a:solidFill>
+                  <a:srgbClr val="000000"/>
+                </a:solidFill>
+                <a:latin typeface="Monaco" charset="0"/>
+              </a:rPr>
+              <a:t>  </a:t>
+            </a:r>
+            <a:r>
+              <a:rPr lang="en-US" altLang="pt-BR" sz="1400" dirty="0">
+                <a:solidFill>
+                  <a:srgbClr val="8F1493"/>
+                </a:solidFill>
+                <a:latin typeface="Monaco" charset="0"/>
+              </a:rPr>
+              <a:t>for</a:t>
+            </a:r>
+            <a:r>
+              <a:rPr lang="en-US" altLang="pt-BR" sz="1400" dirty="0">
+                <a:solidFill>
+                  <a:srgbClr val="000000"/>
+                </a:solidFill>
+                <a:latin typeface="Monaco" charset="0"/>
+              </a:rPr>
+              <a:t> (</a:t>
+            </a:r>
+            <a:r>
+              <a:rPr lang="en-US" altLang="pt-BR" sz="1400" dirty="0" err="1">
+                <a:solidFill>
+                  <a:srgbClr val="8F1493"/>
+                </a:solidFill>
+                <a:latin typeface="Monaco" charset="0"/>
+              </a:rPr>
+              <a:t>var</a:t>
+            </a:r>
+            <a:r>
+              <a:rPr lang="en-US" altLang="pt-BR" sz="1400" dirty="0">
+                <a:solidFill>
+                  <a:srgbClr val="000000"/>
+                </a:solidFill>
+                <a:latin typeface="Monaco" charset="0"/>
+              </a:rPr>
+              <a:t> i:Int=</a:t>
+            </a:r>
+            <a:r>
+              <a:rPr lang="en-US" altLang="pt-BR" sz="1400" dirty="0">
+                <a:solidFill>
+                  <a:srgbClr val="929200"/>
+                </a:solidFill>
+                <a:latin typeface="Monaco" charset="0"/>
+              </a:rPr>
+              <a:t>0</a:t>
+            </a:r>
+            <a:r>
+              <a:rPr lang="en-US" altLang="pt-BR" sz="1400" dirty="0">
+                <a:solidFill>
+                  <a:srgbClr val="000000"/>
+                </a:solidFill>
+                <a:latin typeface="Monaco" charset="0"/>
+              </a:rPr>
+              <a:t>; </a:t>
+            </a:r>
+            <a:r>
+              <a:rPr lang="en-US" altLang="pt-BR" sz="1400" dirty="0" err="1">
+                <a:solidFill>
+                  <a:srgbClr val="000000"/>
+                </a:solidFill>
+                <a:latin typeface="Monaco" charset="0"/>
+              </a:rPr>
+              <a:t>i</a:t>
+            </a:r>
+            <a:r>
+              <a:rPr lang="en-US" altLang="pt-BR" sz="1400" dirty="0">
+                <a:solidFill>
+                  <a:srgbClr val="000000"/>
+                </a:solidFill>
+                <a:latin typeface="Monaco" charset="0"/>
+              </a:rPr>
+              <a:t>&lt;</a:t>
+            </a:r>
+            <a:r>
+              <a:rPr lang="en-US" altLang="pt-BR" sz="1400" dirty="0">
+                <a:solidFill>
+                  <a:srgbClr val="929200"/>
+                </a:solidFill>
+                <a:latin typeface="Monaco" charset="0"/>
+              </a:rPr>
+              <a:t>10</a:t>
+            </a:r>
+            <a:r>
+              <a:rPr lang="en-US" altLang="pt-BR" sz="1400" dirty="0">
+                <a:solidFill>
+                  <a:srgbClr val="000000"/>
+                </a:solidFill>
+                <a:latin typeface="Monaco" charset="0"/>
+              </a:rPr>
+              <a:t>; </a:t>
+            </a:r>
+            <a:r>
+              <a:rPr lang="en-US" altLang="pt-BR" sz="1400" dirty="0" err="1">
+                <a:solidFill>
+                  <a:srgbClr val="000000"/>
+                </a:solidFill>
+                <a:latin typeface="Monaco" charset="0"/>
+              </a:rPr>
+              <a:t>i</a:t>
+            </a:r>
+            <a:r>
+              <a:rPr lang="en-US" altLang="pt-BR" sz="1400" dirty="0">
+                <a:solidFill>
+                  <a:srgbClr val="000000"/>
+                </a:solidFill>
+                <a:latin typeface="Monaco" charset="0"/>
+              </a:rPr>
+              <a:t>++) {</a:t>
+            </a:r>
+          </a:p>
+          <a:p>
+            <a:pPr marL="0" indent="0">
+              <a:buNone/>
+            </a:pPr>
+            <a:r>
+              <a:rPr lang="en-US" altLang="pt-BR" sz="1400" dirty="0">
+                <a:solidFill>
+                  <a:srgbClr val="8F1493"/>
+                </a:solidFill>
+                <a:latin typeface="Monaco" charset="0"/>
+              </a:rPr>
+              <a:t>      at</a:t>
+            </a:r>
+            <a:r>
+              <a:rPr lang="en-US" altLang="pt-BR" sz="1400" dirty="0">
+                <a:solidFill>
+                  <a:srgbClr val="000000"/>
+                </a:solidFill>
+                <a:latin typeface="Monaco" charset="0"/>
+              </a:rPr>
+              <a:t> (</a:t>
+            </a:r>
+            <a:r>
+              <a:rPr lang="en-US" altLang="pt-BR" sz="1400" dirty="0" err="1">
+                <a:solidFill>
+                  <a:srgbClr val="000000"/>
+                </a:solidFill>
+                <a:latin typeface="Monaco" charset="0"/>
+              </a:rPr>
+              <a:t>secondCtr.</a:t>
+            </a:r>
+            <a:r>
+              <a:rPr lang="en-US" altLang="pt-BR" sz="1400" b="1" dirty="0" err="1">
+                <a:solidFill>
+                  <a:srgbClr val="000000"/>
+                </a:solidFill>
+                <a:latin typeface="Monaco" charset="0"/>
+              </a:rPr>
+              <a:t>home</a:t>
+            </a:r>
+            <a:r>
+              <a:rPr lang="en-US" altLang="pt-BR" sz="1400" dirty="0">
+                <a:solidFill>
+                  <a:srgbClr val="000000"/>
+                </a:solidFill>
+                <a:latin typeface="Monaco" charset="0"/>
+              </a:rPr>
+              <a:t>) {</a:t>
+            </a:r>
+          </a:p>
+          <a:p>
+            <a:pPr marL="0" indent="0">
+              <a:buNone/>
+            </a:pPr>
+            <a:r>
+              <a:rPr lang="en-US" altLang="pt-BR" sz="1400" dirty="0">
+                <a:solidFill>
+                  <a:srgbClr val="000000"/>
+                </a:solidFill>
+                <a:latin typeface="Monaco" charset="0"/>
+              </a:rPr>
+              <a:t>        </a:t>
+            </a:r>
+            <a:r>
+              <a:rPr lang="en-US" altLang="pt-BR" sz="1400" dirty="0" err="1">
+                <a:solidFill>
+                  <a:srgbClr val="000000"/>
+                </a:solidFill>
+                <a:latin typeface="Monaco" charset="0"/>
+              </a:rPr>
+              <a:t>secondCtr</a:t>
+            </a:r>
+            <a:r>
+              <a:rPr lang="en-US" altLang="pt-BR" sz="1400" dirty="0">
+                <a:solidFill>
+                  <a:srgbClr val="000000"/>
+                </a:solidFill>
+                <a:latin typeface="Monaco" charset="0"/>
+              </a:rPr>
+              <a:t>().count();</a:t>
+            </a:r>
+          </a:p>
+          <a:p>
+            <a:pPr marL="0" indent="0">
+              <a:buNone/>
+            </a:pPr>
+            <a:r>
+              <a:rPr lang="en-US" altLang="pt-BR" sz="1400" dirty="0">
+                <a:solidFill>
+                  <a:srgbClr val="000000"/>
+                </a:solidFill>
+                <a:latin typeface="Monaco" charset="0"/>
+              </a:rPr>
+              <a:t>      }</a:t>
+            </a:r>
+          </a:p>
+          <a:p>
+            <a:pPr marL="0" indent="0">
+              <a:buNone/>
+            </a:pPr>
+            <a:r>
+              <a:rPr lang="en-US" altLang="pt-BR" sz="1400" dirty="0">
+                <a:solidFill>
+                  <a:srgbClr val="000000"/>
+                </a:solidFill>
+                <a:latin typeface="Monaco" charset="0"/>
+              </a:rPr>
+              <a:t>    }</a:t>
+            </a:r>
+          </a:p>
+          <a:p>
+            <a:pPr marL="0" indent="0">
+              <a:buNone/>
+            </a:pPr>
+            <a:r>
+              <a:rPr lang="en-US" altLang="pt-BR" sz="1400" dirty="0">
+                <a:solidFill>
+                  <a:srgbClr val="8F1493"/>
+                </a:solidFill>
+                <a:latin typeface="Monaco" charset="0"/>
+              </a:rPr>
+              <a:t>  </a:t>
+            </a:r>
+            <a:r>
+              <a:rPr lang="en-US" altLang="pt-BR" sz="1400" dirty="0" err="1">
+                <a:solidFill>
+                  <a:srgbClr val="8F1493"/>
+                </a:solidFill>
+                <a:latin typeface="Monaco" charset="0"/>
+              </a:rPr>
+              <a:t>val</a:t>
+            </a:r>
+            <a:r>
+              <a:rPr lang="en-US" altLang="pt-BR" sz="1400" dirty="0">
+                <a:solidFill>
+                  <a:srgbClr val="000000"/>
+                </a:solidFill>
+                <a:latin typeface="Monaco" charset="0"/>
+              </a:rPr>
+              <a:t> </a:t>
+            </a:r>
+            <a:r>
+              <a:rPr lang="en-US" altLang="pt-BR" sz="1400" dirty="0" err="1">
+                <a:solidFill>
+                  <a:srgbClr val="000000"/>
+                </a:solidFill>
+                <a:latin typeface="Monaco" charset="0"/>
+              </a:rPr>
+              <a:t>secondValue</a:t>
+            </a:r>
+            <a:r>
+              <a:rPr lang="en-US" altLang="pt-BR" sz="1400" dirty="0">
+                <a:solidFill>
+                  <a:srgbClr val="000000"/>
+                </a:solidFill>
+                <a:latin typeface="Monaco" charset="0"/>
+              </a:rPr>
+              <a:t> = (</a:t>
+            </a:r>
+            <a:r>
+              <a:rPr lang="en-US" altLang="pt-BR" sz="1400" dirty="0">
+                <a:solidFill>
+                  <a:srgbClr val="8F1493"/>
+                </a:solidFill>
+                <a:latin typeface="Monaco" charset="0"/>
+              </a:rPr>
+              <a:t>at</a:t>
+            </a:r>
+            <a:r>
+              <a:rPr lang="en-US" altLang="pt-BR" sz="1400" dirty="0">
+                <a:solidFill>
+                  <a:srgbClr val="000000"/>
+                </a:solidFill>
+                <a:latin typeface="Monaco" charset="0"/>
+              </a:rPr>
+              <a:t> (</a:t>
+            </a:r>
+            <a:r>
+              <a:rPr lang="en-US" altLang="pt-BR" sz="1400" dirty="0" err="1">
+                <a:solidFill>
+                  <a:srgbClr val="000000"/>
+                </a:solidFill>
+                <a:latin typeface="Monaco" charset="0"/>
+              </a:rPr>
+              <a:t>secondCtr.home</a:t>
+            </a:r>
+            <a:r>
+              <a:rPr lang="en-US" altLang="pt-BR" sz="1400" dirty="0">
+                <a:solidFill>
+                  <a:srgbClr val="000000"/>
+                </a:solidFill>
+                <a:latin typeface="Monaco" charset="0"/>
+              </a:rPr>
+              <a:t>) </a:t>
+            </a:r>
+            <a:r>
+              <a:rPr lang="en-US" altLang="pt-BR" sz="1400" dirty="0" err="1">
+                <a:solidFill>
+                  <a:srgbClr val="000000"/>
+                </a:solidFill>
+                <a:latin typeface="Monaco" charset="0"/>
+              </a:rPr>
+              <a:t>secondCtr</a:t>
+            </a:r>
+            <a:r>
+              <a:rPr lang="en-US" altLang="pt-BR" sz="1400" dirty="0">
+                <a:solidFill>
+                  <a:srgbClr val="000000"/>
+                </a:solidFill>
+                <a:latin typeface="Monaco" charset="0"/>
+              </a:rPr>
+              <a:t>().</a:t>
+            </a:r>
+            <a:r>
+              <a:rPr lang="en-US" altLang="pt-BR" sz="1400" dirty="0" err="1">
+                <a:solidFill>
+                  <a:srgbClr val="000000"/>
+                </a:solidFill>
+                <a:latin typeface="Monaco" charset="0"/>
+              </a:rPr>
+              <a:t>getCount</a:t>
+            </a:r>
+            <a:r>
+              <a:rPr lang="en-US" altLang="pt-BR" sz="1400" dirty="0">
+                <a:solidFill>
+                  <a:srgbClr val="000000"/>
+                </a:solidFill>
+                <a:latin typeface="Monaco" charset="0"/>
+              </a:rPr>
+              <a:t>());</a:t>
+            </a:r>
+          </a:p>
+          <a:p>
+            <a:pPr marL="0" indent="0">
+              <a:buNone/>
+            </a:pPr>
+            <a:r>
+              <a:rPr lang="en-US" altLang="pt-BR" sz="1400" dirty="0">
+                <a:solidFill>
+                  <a:srgbClr val="000000"/>
+                </a:solidFill>
+                <a:latin typeface="Monaco" charset="0"/>
+              </a:rPr>
+              <a:t>  </a:t>
+            </a:r>
+            <a:r>
+              <a:rPr lang="en-US" altLang="pt-BR" sz="1400" dirty="0" err="1">
+                <a:solidFill>
+                  <a:srgbClr val="000000"/>
+                </a:solidFill>
+                <a:latin typeface="Monaco" charset="0"/>
+              </a:rPr>
+              <a:t>Console.OUT.println</a:t>
+            </a:r>
+            <a:r>
+              <a:rPr lang="en-US" altLang="pt-BR" sz="1400" dirty="0">
+                <a:solidFill>
+                  <a:srgbClr val="000000"/>
+                </a:solidFill>
+                <a:latin typeface="Monaco" charset="0"/>
+              </a:rPr>
+              <a:t>(</a:t>
+            </a:r>
+            <a:r>
+              <a:rPr lang="en-US" altLang="pt-BR" sz="1400" dirty="0">
+                <a:solidFill>
+                  <a:srgbClr val="0B0493"/>
+                </a:solidFill>
+                <a:latin typeface="Monaco" charset="0"/>
+              </a:rPr>
+              <a:t>"Second value = "</a:t>
+            </a:r>
+            <a:r>
+              <a:rPr lang="en-US" altLang="pt-BR" sz="1400" dirty="0">
+                <a:solidFill>
+                  <a:srgbClr val="000000"/>
+                </a:solidFill>
+                <a:latin typeface="Monaco" charset="0"/>
+              </a:rPr>
+              <a:t>+</a:t>
+            </a:r>
+            <a:r>
+              <a:rPr lang="en-US" altLang="pt-BR" sz="1400" dirty="0" err="1">
+                <a:solidFill>
+                  <a:srgbClr val="000000"/>
+                </a:solidFill>
+                <a:latin typeface="Monaco" charset="0"/>
+              </a:rPr>
+              <a:t>secondValue</a:t>
+            </a:r>
+            <a:r>
+              <a:rPr lang="en-US" altLang="pt-BR" sz="1400" dirty="0">
+                <a:solidFill>
+                  <a:srgbClr val="000000"/>
+                </a:solidFill>
+                <a:latin typeface="Monaco" charset="0"/>
+              </a:rPr>
+              <a:t>);</a:t>
+            </a:r>
+          </a:p>
+          <a:p>
+            <a:pPr marL="0" indent="0">
+              <a:buNone/>
+            </a:pPr>
+            <a:r>
+              <a:rPr lang="en-US" altLang="pt-BR" sz="1400" dirty="0">
+                <a:solidFill>
+                  <a:srgbClr val="000000"/>
+                </a:solidFill>
+                <a:latin typeface="Monaco" charset="0"/>
+              </a:rPr>
+              <a:t>}</a:t>
+            </a:r>
+          </a:p>
+          <a:p>
+            <a:pPr marL="0" indent="0">
+              <a:buNone/>
+            </a:pPr>
+            <a:endParaRPr lang="pt-BR" sz="1200" dirty="0"/>
+          </a:p>
+        </p:txBody>
+      </p:sp>
+    </p:spTree>
+    <p:extLst>
+      <p:ext uri="{BB962C8B-B14F-4D97-AF65-F5344CB8AC3E}">
+        <p14:creationId xmlns:p14="http://schemas.microsoft.com/office/powerpoint/2010/main" val="1748814407"/>
+      </p:ext>
+    </p:extLst>
+  </p:cSld>
+  <p:clrMapOvr>
+    <a:masterClrMapping/>
+  </p:clrMapOvr>
+  <p:timing>
+    <p:tnLst>
+      <p:par>
+        <p:cTn id="1" dur="indefinite" restart="never" nodeType="tmRoot"/>
+      </p:par>
+    </p:tnLst>
+  </p:timing>
+</p:sld>
+</file>
+
+<file path=ppt/slides/slide15.xml><?xml version="1.0" encoding="utf-8"?>
 <p:sld xmlns:a="http://schemas.openxmlformats.org/drawingml/2006/main" xmlns:r="http://schemas.openxmlformats.org/officeDocument/2006/relationships" xmlns:p="http://schemas.openxmlformats.org/presentationml/2006/main">
   <p:cSld>
     <p:spTree>
@@ -5037,7 +7272,7 @@
 </p:sld>
 </file>
 
-<file path=ppt/slides/slide13.xml><?xml version="1.0" encoding="utf-8"?>
+<file path=ppt/slides/slide16.xml><?xml version="1.0" encoding="utf-8"?>
 <p:sld xmlns:a="http://schemas.openxmlformats.org/drawingml/2006/main" xmlns:r="http://schemas.openxmlformats.org/officeDocument/2006/relationships" xmlns:p="http://schemas.openxmlformats.org/presentationml/2006/main">
   <p:cSld>
     <p:spTree>
@@ -5911,7 +8146,7 @@
 </p:sld>
 </file>
 
-<file path=ppt/slides/slide14.xml><?xml version="1.0" encoding="utf-8"?>
+<file path=ppt/slides/slide17.xml><?xml version="1.0" encoding="utf-8"?>
 <p:sld xmlns:a="http://schemas.openxmlformats.org/drawingml/2006/main" xmlns:r="http://schemas.openxmlformats.org/officeDocument/2006/relationships" xmlns:p="http://schemas.openxmlformats.org/presentationml/2006/main">
   <p:cSld>
     <p:spTree>
@@ -6067,6 +8302,105 @@
     <p:extLst>
       <p:ext uri="{BB962C8B-B14F-4D97-AF65-F5344CB8AC3E}">
         <p14:creationId xmlns:p14="http://schemas.microsoft.com/office/powerpoint/2010/main" val="915000722"/>
+      </p:ext>
+    </p:extLst>
+  </p:cSld>
+  <p:clrMapOvr>
+    <a:masterClrMapping/>
+  </p:clrMapOvr>
+  <p:timing>
+    <p:tnLst>
+      <p:par>
+        <p:cTn id="1" dur="indefinite" restart="never" nodeType="tmRoot"/>
+      </p:par>
+    </p:tnLst>
+  </p:timing>
+</p:sld>
+</file>
+
+<file path=ppt/slides/slide18.xml><?xml version="1.0" encoding="utf-8"?>
+<p:sld xmlns:a="http://schemas.openxmlformats.org/drawingml/2006/main" xmlns:r="http://schemas.openxmlformats.org/officeDocument/2006/relationships" xmlns:p="http://schemas.openxmlformats.org/presentationml/2006/main">
+  <p:cSld>
+    <p:spTree>
+      <p:nvGrpSpPr>
+        <p:cNvPr id="1" name=""/>
+        <p:cNvGrpSpPr/>
+        <p:nvPr/>
+      </p:nvGrpSpPr>
+      <p:grpSpPr>
+        <a:xfrm>
+          <a:off x="0" y="0"/>
+          <a:ext cx="0" cy="0"/>
+          <a:chOff x="0" y="0"/>
+          <a:chExt cx="0" cy="0"/>
+        </a:xfrm>
+      </p:grpSpPr>
+      <p:sp>
+        <p:nvSpPr>
+          <p:cNvPr id="2" name="Title 1"/>
+          <p:cNvSpPr>
+            <a:spLocks noGrp="1"/>
+          </p:cNvSpPr>
+          <p:nvPr>
+            <p:ph type="title"/>
+          </p:nvPr>
+        </p:nvSpPr>
+        <p:spPr/>
+        <p:txBody>
+          <a:bodyPr/>
+          <a:lstStyle/>
+          <a:p>
+            <a:pPr algn="just"/>
+            <a:r>
+              <a:rPr lang="pt-BR" dirty="0" smtClean="0"/>
+              <a:t>X10</a:t>
+            </a:r>
+            <a:endParaRPr lang="pt-BR" dirty="0"/>
+          </a:p>
+        </p:txBody>
+      </p:sp>
+      <p:sp>
+        <p:nvSpPr>
+          <p:cNvPr id="3" name="Content Placeholder 2"/>
+          <p:cNvSpPr>
+            <a:spLocks noGrp="1"/>
+          </p:cNvSpPr>
+          <p:nvPr>
+            <p:ph idx="1"/>
+          </p:nvPr>
+        </p:nvSpPr>
+        <p:spPr/>
+        <p:txBody>
+          <a:bodyPr/>
+          <a:lstStyle/>
+          <a:p>
+            <a:r>
+              <a:rPr lang="pt-BR" dirty="0" smtClean="0"/>
+              <a:t>Documentação:</a:t>
+            </a:r>
+          </a:p>
+          <a:p>
+            <a:pPr lvl="1"/>
+            <a:r>
+              <a:rPr lang="pt-BR" dirty="0">
+                <a:hlinkClick r:id="rId2"/>
+              </a:rPr>
+              <a:t>http://x10.sourceforge.net/x10doc/2.3.0/x10</a:t>
+            </a:r>
+            <a:r>
+              <a:rPr lang="pt-BR" dirty="0" smtClean="0">
+                <a:hlinkClick r:id="rId2"/>
+              </a:rPr>
+              <a:t>/</a:t>
+            </a:r>
+            <a:endParaRPr lang="pt-BR" dirty="0" smtClean="0"/>
+          </a:p>
+        </p:txBody>
+      </p:sp>
+    </p:spTree>
+    <p:extLst>
+      <p:ext uri="{BB962C8B-B14F-4D97-AF65-F5344CB8AC3E}">
+        <p14:creationId xmlns:p14="http://schemas.microsoft.com/office/powerpoint/2010/main" val="161675432"/>
       </p:ext>
     </p:extLst>
   </p:cSld>
@@ -9972,6 +12306,13 @@
   <p:clrMapOvr>
     <a:masterClrMapping/>
   </p:clrMapOvr>
+  <p:timing>
+    <p:tnLst>
+      <p:par>
+        <p:cTn id="1" dur="indefinite" restart="never" nodeType="tmRoot"/>
+      </p:par>
+    </p:tnLst>
+  </p:timing>
 </p:sld>
 </file>
 
@@ -10009,12 +12350,12 @@
           </a:bodyPr>
           <a:lstStyle/>
           <a:p>
-            <a:pPr algn="l"/>
-            <a:r>
-              <a:rPr lang="pt-BR" sz="2400" i="1" dirty="0" smtClean="0"/>
-              <a:t>at</a:t>
-            </a:r>
-            <a:endParaRPr lang="pt-BR" sz="2400" i="1" dirty="0"/>
+            <a:pPr algn="just"/>
+            <a:r>
+              <a:rPr lang="pt-BR" sz="2400" dirty="0" smtClean="0"/>
+              <a:t>X10</a:t>
+            </a:r>
+            <a:endParaRPr lang="pt-BR" sz="2400" dirty="0"/>
           </a:p>
         </p:txBody>
       </p:sp>
@@ -10031,74 +12372,119 @@
         <p:spPr/>
         <p:txBody>
           <a:bodyPr>
-            <a:normAutofit/>
+            <a:noAutofit/>
           </a:bodyPr>
           <a:lstStyle/>
           <a:p>
             <a:r>
               <a:rPr lang="pt-BR" sz="1800" b="1" dirty="0" smtClean="0"/>
-              <a:t>Stmt ::= </a:t>
-            </a:r>
-            <a:r>
-              <a:rPr lang="pt-BR" sz="1800" b="1" dirty="0" smtClean="0">
-                <a:solidFill>
-                  <a:srgbClr val="C00000"/>
-                </a:solidFill>
-              </a:rPr>
-              <a:t>at</a:t>
-            </a:r>
+              <a:t>async </a:t>
+            </a:r>
+            <a:r>
+              <a:rPr lang="pt-BR" sz="1800" b="1" dirty="0"/>
+              <a:t>S</a:t>
+            </a:r>
+          </a:p>
+          <a:p>
+            <a:endParaRPr lang="pt-BR" sz="1800" b="1" dirty="0" smtClean="0"/>
+          </a:p>
+          <a:p>
             <a:r>
               <a:rPr lang="pt-BR" sz="1800" b="1" dirty="0" smtClean="0"/>
-              <a:t> (p) Stmt</a:t>
-            </a:r>
-          </a:p>
-          <a:p>
-            <a:endParaRPr lang="pt-BR" sz="1800" dirty="0" smtClean="0"/>
-          </a:p>
-          <a:p>
-            <a:r>
-              <a:rPr lang="pt-BR" sz="1800" dirty="0" smtClean="0"/>
-              <a:t>at (p) { ... }</a:t>
-            </a:r>
-          </a:p>
-          <a:p>
-            <a:endParaRPr lang="pt-BR" sz="1800" dirty="0" smtClean="0"/>
-          </a:p>
-          <a:p>
-            <a:r>
-              <a:rPr lang="pt-BR" sz="1800" dirty="0" smtClean="0"/>
-              <a:t>Sendo ‘p’ é relacionado ao </a:t>
-            </a:r>
-            <a:r>
-              <a:rPr lang="pt-BR" sz="1800" i="1" dirty="0" smtClean="0"/>
-              <a:t>place </a:t>
-            </a:r>
-            <a:r>
-              <a:rPr lang="pt-BR" sz="1800" dirty="0" smtClean="0"/>
-              <a:t>em que o bloco de código será executado.</a:t>
-            </a:r>
-          </a:p>
-          <a:p>
-            <a:endParaRPr lang="pt-BR" sz="1800" dirty="0"/>
-          </a:p>
-          <a:p>
-            <a:r>
-              <a:rPr lang="pt-BR" sz="1800" dirty="0" smtClean="0"/>
-              <a:t>Atividade do processo “pai” é bloqueado até que o trecho em { ... } seja completado.</a:t>
-            </a:r>
+              <a:t>atomic </a:t>
+            </a:r>
+            <a:r>
+              <a:rPr lang="pt-BR" sz="1800" b="1" dirty="0"/>
+              <a:t>S</a:t>
+            </a:r>
+          </a:p>
+          <a:p>
+            <a:r>
+              <a:rPr lang="pt-BR" sz="1800" b="1" dirty="0" smtClean="0"/>
+              <a:t>when </a:t>
+            </a:r>
+            <a:r>
+              <a:rPr lang="pt-BR" sz="1800" b="1" dirty="0"/>
+              <a:t>(c) S</a:t>
+            </a:r>
+          </a:p>
+          <a:p>
+            <a:endParaRPr lang="pt-BR" sz="1800" b="1" dirty="0" smtClean="0"/>
+          </a:p>
+          <a:p>
+            <a:r>
+              <a:rPr lang="pt-BR" sz="1800" b="1" dirty="0" smtClean="0"/>
+              <a:t>at </a:t>
+            </a:r>
+            <a:r>
+              <a:rPr lang="pt-BR" sz="1800" b="1" dirty="0"/>
+              <a:t>(P) S</a:t>
+            </a:r>
+          </a:p>
+          <a:p>
+            <a:endParaRPr lang="pt-BR" sz="1800" b="1" dirty="0" smtClean="0"/>
+          </a:p>
+          <a:p>
+            <a:r>
+              <a:rPr lang="pt-BR" sz="1800" b="1" dirty="0" smtClean="0"/>
+              <a:t>finish </a:t>
+            </a:r>
+            <a:r>
+              <a:rPr lang="pt-BR" sz="1800" b="1" dirty="0"/>
+              <a:t>S</a:t>
+            </a:r>
+          </a:p>
+          <a:p>
+            <a:r>
+              <a:rPr lang="pt-BR" sz="1800" b="1" dirty="0" smtClean="0"/>
+              <a:t>clocked</a:t>
+            </a:r>
+            <a:r>
+              <a:rPr lang="pt-BR" sz="1800" b="1" dirty="0"/>
+              <a:t>, </a:t>
+            </a:r>
+            <a:r>
+              <a:rPr lang="pt-BR" sz="1800" b="1" dirty="0" smtClean="0"/>
+              <a:t>next</a:t>
+            </a:r>
+          </a:p>
+          <a:p>
+            <a:endParaRPr lang="pt-BR" sz="1800" b="1" dirty="0" smtClean="0"/>
+          </a:p>
+          <a:p>
+            <a:r>
+              <a:rPr lang="pt-BR" sz="1800" b="1" dirty="0" smtClean="0"/>
+              <a:t>points</a:t>
+            </a:r>
+            <a:r>
+              <a:rPr lang="pt-BR" sz="1800" b="1" dirty="0"/>
+              <a:t>, regions</a:t>
+            </a:r>
+            <a:r>
+              <a:rPr lang="pt-BR" sz="1800" b="1" dirty="0" smtClean="0"/>
+              <a:t>, distributions, arrays</a:t>
+            </a:r>
+            <a:endParaRPr lang="pt-BR" sz="1800" b="1" dirty="0"/>
           </a:p>
         </p:txBody>
       </p:sp>
     </p:spTree>
     <p:extLst>
       <p:ext uri="{BB962C8B-B14F-4D97-AF65-F5344CB8AC3E}">
-        <p14:creationId xmlns:p14="http://schemas.microsoft.com/office/powerpoint/2010/main" val="1383358882"/>
+        <p14:creationId xmlns:p14="http://schemas.microsoft.com/office/powerpoint/2010/main" val="2337113772"/>
       </p:ext>
     </p:extLst>
   </p:cSld>
   <p:clrMapOvr>
     <a:masterClrMapping/>
   </p:clrMapOvr>
+  <p:timing>
+    <p:tnLst>
+      <p:par>
+        <p:cTn id="1" dur="indefinite" restart="never" nodeType="tmRoot"/>
+      </p:par>
+    </p:tnLst>
+  </p:timing>
 </p:sld>
 </file>
 
@@ -10139,7 +12525,7 @@
             <a:pPr algn="l"/>
             <a:r>
               <a:rPr lang="pt-BR" sz="2400" i="1" dirty="0" smtClean="0"/>
-              <a:t>async</a:t>
+              <a:t>at</a:t>
             </a:r>
             <a:endParaRPr lang="pt-BR" sz="2400" i="1" dirty="0"/>
           </a:p>
@@ -10157,192 +12543,82 @@
         </p:nvSpPr>
         <p:spPr/>
         <p:txBody>
-          <a:bodyPr/>
+          <a:bodyPr>
+            <a:normAutofit/>
+          </a:bodyPr>
           <a:lstStyle/>
           <a:p>
             <a:r>
-              <a:rPr lang="en-US" altLang="pt-BR" sz="1800" b="1" dirty="0" err="1" smtClean="0">
-                <a:cs typeface="Arial" pitchFamily="34" charset="0"/>
-              </a:rPr>
-              <a:t>Stmt</a:t>
-            </a:r>
-            <a:r>
-              <a:rPr lang="en-US" altLang="pt-BR" sz="1800" b="1" dirty="0" smtClean="0">
-                <a:cs typeface="Arial" pitchFamily="34" charset="0"/>
-              </a:rPr>
-              <a:t> ::=  </a:t>
-            </a:r>
-            <a:r>
-              <a:rPr lang="en-US" altLang="pt-BR" sz="1800" b="1" dirty="0" err="1" smtClean="0">
+              <a:rPr lang="pt-BR" sz="1800" b="1" dirty="0" smtClean="0"/>
+              <a:t>Stmt ::= </a:t>
+            </a:r>
+            <a:r>
+              <a:rPr lang="pt-BR" sz="1800" b="1" dirty="0" smtClean="0">
                 <a:solidFill>
                   <a:srgbClr val="C00000"/>
                 </a:solidFill>
-                <a:cs typeface="Arial" pitchFamily="34" charset="0"/>
-              </a:rPr>
-              <a:t>async</a:t>
-            </a:r>
-            <a:r>
-              <a:rPr lang="en-US" altLang="pt-BR" sz="1800" b="1" dirty="0" smtClean="0">
-                <a:solidFill>
-                  <a:srgbClr val="C00000"/>
-                </a:solidFill>
-                <a:cs typeface="Arial" pitchFamily="34" charset="0"/>
-              </a:rPr>
-              <a:t> </a:t>
-            </a:r>
-            <a:r>
-              <a:rPr lang="en-US" altLang="pt-BR" sz="1800" b="1" dirty="0" smtClean="0">
-                <a:cs typeface="Arial" pitchFamily="34" charset="0"/>
-              </a:rPr>
-              <a:t>(</a:t>
-            </a:r>
-            <a:r>
-              <a:rPr lang="en-US" altLang="pt-BR" sz="1800" b="1" dirty="0" err="1" smtClean="0">
-                <a:cs typeface="Arial" pitchFamily="34" charset="0"/>
-              </a:rPr>
-              <a:t>p,l</a:t>
-            </a:r>
-            <a:r>
-              <a:rPr lang="en-US" altLang="pt-BR" sz="1800" b="1" dirty="0" smtClean="0">
-                <a:cs typeface="Arial" pitchFamily="34" charset="0"/>
-              </a:rPr>
-              <a:t>)  </a:t>
-            </a:r>
-            <a:r>
-              <a:rPr lang="en-US" altLang="pt-BR" sz="1800" b="1" dirty="0" err="1" smtClean="0">
-                <a:cs typeface="Arial" pitchFamily="34" charset="0"/>
-              </a:rPr>
-              <a:t>Stmt</a:t>
-            </a:r>
-            <a:endParaRPr lang="en-US" altLang="pt-BR" sz="1800" b="1" dirty="0" smtClean="0">
-              <a:cs typeface="Arial" pitchFamily="34" charset="0"/>
-            </a:endParaRPr>
-          </a:p>
-          <a:p>
-            <a:endParaRPr lang="en-US" altLang="pt-BR" sz="1800" dirty="0" smtClean="0">
-              <a:cs typeface="Arial" pitchFamily="34" charset="0"/>
-            </a:endParaRPr>
-          </a:p>
-          <a:p>
-            <a:r>
-              <a:rPr lang="en-US" altLang="pt-BR" sz="1800" dirty="0" err="1" smtClean="0">
-                <a:cs typeface="Arial" pitchFamily="34" charset="0"/>
-              </a:rPr>
-              <a:t>async</a:t>
-            </a:r>
-            <a:r>
-              <a:rPr lang="en-US" altLang="pt-BR" sz="1800" dirty="0" smtClean="0">
-                <a:cs typeface="Arial" pitchFamily="34" charset="0"/>
-              </a:rPr>
-              <a:t> { … }</a:t>
-            </a:r>
-          </a:p>
-          <a:p>
-            <a:endParaRPr lang="en-US" altLang="pt-BR" sz="1800" dirty="0" smtClean="0">
-              <a:cs typeface="Arial" pitchFamily="34" charset="0"/>
-            </a:endParaRPr>
-          </a:p>
-          <a:p>
-            <a:r>
-              <a:rPr lang="en-US" altLang="pt-BR" sz="1800" dirty="0" err="1" smtClean="0">
-                <a:cs typeface="Arial" pitchFamily="34" charset="0"/>
-              </a:rPr>
-              <a:t>Cria</a:t>
-            </a:r>
-            <a:r>
-              <a:rPr lang="en-US" altLang="pt-BR" sz="1800" dirty="0" smtClean="0">
-                <a:cs typeface="Arial" pitchFamily="34" charset="0"/>
-              </a:rPr>
-              <a:t> </a:t>
-            </a:r>
-            <a:r>
-              <a:rPr lang="en-US" altLang="pt-BR" sz="1800" dirty="0" err="1" smtClean="0">
-                <a:cs typeface="Arial" pitchFamily="34" charset="0"/>
-              </a:rPr>
-              <a:t>uma</a:t>
-            </a:r>
-            <a:r>
-              <a:rPr lang="en-US" altLang="pt-BR" sz="1800" dirty="0" smtClean="0">
-                <a:cs typeface="Arial" pitchFamily="34" charset="0"/>
-              </a:rPr>
-              <a:t> nova </a:t>
-            </a:r>
-            <a:r>
-              <a:rPr lang="en-US" altLang="pt-BR" sz="1800" dirty="0" err="1" smtClean="0">
-                <a:cs typeface="Arial" pitchFamily="34" charset="0"/>
-              </a:rPr>
-              <a:t>atividade</a:t>
-            </a:r>
-            <a:r>
-              <a:rPr lang="en-US" altLang="pt-BR" sz="1800" dirty="0" smtClean="0">
-                <a:cs typeface="Arial" pitchFamily="34" charset="0"/>
-              </a:rPr>
-              <a:t> para </a:t>
-            </a:r>
-            <a:r>
-              <a:rPr lang="en-US" altLang="pt-BR" sz="1800" dirty="0" err="1" smtClean="0">
-                <a:cs typeface="Arial" pitchFamily="34" charset="0"/>
-              </a:rPr>
-              <a:t>avaliar</a:t>
-            </a:r>
-            <a:r>
-              <a:rPr lang="en-US" altLang="pt-BR" sz="1800" dirty="0" smtClean="0">
-                <a:cs typeface="Arial" pitchFamily="34" charset="0"/>
-              </a:rPr>
-              <a:t> </a:t>
-            </a:r>
-            <a:r>
-              <a:rPr lang="en-US" altLang="pt-BR" sz="1800" dirty="0" err="1" smtClean="0">
-                <a:cs typeface="Arial" pitchFamily="34" charset="0"/>
-              </a:rPr>
-              <a:t>comandos</a:t>
-            </a:r>
-            <a:r>
-              <a:rPr lang="en-US" altLang="pt-BR" sz="1800" dirty="0" smtClean="0">
-                <a:cs typeface="Arial" pitchFamily="34" charset="0"/>
-              </a:rPr>
-              <a:t> de </a:t>
-            </a:r>
-            <a:r>
-              <a:rPr lang="en-US" altLang="pt-BR" sz="1800" dirty="0" err="1" smtClean="0">
-                <a:cs typeface="Arial" pitchFamily="34" charset="0"/>
-              </a:rPr>
-              <a:t>maneira</a:t>
-            </a:r>
-            <a:r>
-              <a:rPr lang="en-US" altLang="pt-BR" sz="1800" dirty="0" smtClean="0">
-                <a:cs typeface="Arial" pitchFamily="34" charset="0"/>
-              </a:rPr>
-              <a:t> </a:t>
-            </a:r>
-            <a:r>
-              <a:rPr lang="en-US" altLang="pt-BR" sz="1800" dirty="0" err="1" smtClean="0">
-                <a:cs typeface="Arial" pitchFamily="34" charset="0"/>
-              </a:rPr>
-              <a:t>assíncrona</a:t>
-            </a:r>
-            <a:r>
-              <a:rPr lang="en-US" altLang="pt-BR" sz="1800" dirty="0" smtClean="0">
-                <a:cs typeface="Arial" pitchFamily="34" charset="0"/>
-              </a:rPr>
-              <a:t>.</a:t>
-            </a:r>
-          </a:p>
-          <a:p>
-            <a:endParaRPr lang="pt-BR" dirty="0"/>
+              </a:rPr>
+              <a:t>at</a:t>
+            </a:r>
+            <a:r>
+              <a:rPr lang="pt-BR" sz="1800" b="1" dirty="0" smtClean="0"/>
+              <a:t> (p) Stmt</a:t>
+            </a:r>
+          </a:p>
+          <a:p>
+            <a:endParaRPr lang="pt-BR" sz="1800" dirty="0" smtClean="0"/>
+          </a:p>
+          <a:p>
+            <a:r>
+              <a:rPr lang="pt-BR" sz="1800" dirty="0" smtClean="0"/>
+              <a:t>at (p) { ... }</a:t>
+            </a:r>
+          </a:p>
+          <a:p>
+            <a:endParaRPr lang="pt-BR" sz="1800" dirty="0" smtClean="0"/>
+          </a:p>
+          <a:p>
+            <a:r>
+              <a:rPr lang="pt-BR" sz="1800" dirty="0" smtClean="0"/>
+              <a:t>Sendo ‘p’ é relacionado ao </a:t>
+            </a:r>
+            <a:r>
+              <a:rPr lang="pt-BR" sz="1800" i="1" dirty="0" smtClean="0"/>
+              <a:t>place </a:t>
+            </a:r>
+            <a:r>
+              <a:rPr lang="pt-BR" sz="1800" dirty="0" smtClean="0"/>
+              <a:t>em que o bloco de código será executado.</a:t>
+            </a:r>
+          </a:p>
+          <a:p>
+            <a:endParaRPr lang="pt-BR" sz="1800" dirty="0"/>
+          </a:p>
+          <a:p>
+            <a:r>
+              <a:rPr lang="pt-BR" sz="1800" dirty="0" smtClean="0"/>
+              <a:t>Atividade do processo “pai” é bloqueado até que o trecho em { ... } seja completado.</a:t>
+            </a:r>
           </a:p>
         </p:txBody>
       </p:sp>
     </p:spTree>
     <p:extLst>
       <p:ext uri="{BB962C8B-B14F-4D97-AF65-F5344CB8AC3E}">
-        <p14:creationId xmlns:p14="http://schemas.microsoft.com/office/powerpoint/2010/main" val="404802352"/>
+        <p14:creationId xmlns:p14="http://schemas.microsoft.com/office/powerpoint/2010/main" val="1383358882"/>
       </p:ext>
     </p:extLst>
   </p:cSld>
   <p:clrMapOvr>
     <a:masterClrMapping/>
   </p:clrMapOvr>
+  <p:timing>
+    <p:tnLst>
+      <p:par>
+        <p:cTn id="1" dur="indefinite" restart="never" nodeType="tmRoot"/>
+      </p:par>
+    </p:tnLst>
+  </p:timing>
 </p:sld>
 </file>
 
@@ -10383,7 +12659,7 @@
             <a:pPr algn="l"/>
             <a:r>
               <a:rPr lang="pt-BR" sz="2400" i="1" dirty="0" smtClean="0"/>
-              <a:t>finish</a:t>
+              <a:t>async</a:t>
             </a:r>
             <a:endParaRPr lang="pt-BR" sz="2400" i="1" dirty="0"/>
           </a:p>
@@ -10405,414 +12681,195 @@
           <a:lstStyle/>
           <a:p>
             <a:r>
-              <a:rPr lang="en-US" altLang="pt-BR" sz="2000" b="1" i="1" dirty="0" err="1" smtClean="0">
+              <a:rPr lang="en-US" altLang="pt-BR" sz="1800" b="1" dirty="0" err="1" smtClean="0">
                 <a:cs typeface="Arial" pitchFamily="34" charset="0"/>
               </a:rPr>
               <a:t>Stmt</a:t>
             </a:r>
             <a:r>
-              <a:rPr lang="en-US" altLang="pt-BR" sz="2000" b="1" i="1" dirty="0" smtClean="0">
+              <a:rPr lang="en-US" altLang="pt-BR" sz="1800" b="1" dirty="0" smtClean="0">
                 <a:cs typeface="Arial" pitchFamily="34" charset="0"/>
               </a:rPr>
               <a:t> ::=  </a:t>
             </a:r>
             <a:r>
-              <a:rPr lang="en-US" altLang="pt-BR" sz="2000" b="1" dirty="0" smtClean="0">
+              <a:rPr lang="en-US" altLang="pt-BR" sz="1800" b="1" dirty="0" err="1" smtClean="0">
                 <a:solidFill>
                   <a:srgbClr val="C00000"/>
                 </a:solidFill>
                 <a:cs typeface="Arial" pitchFamily="34" charset="0"/>
               </a:rPr>
-              <a:t>finish</a:t>
-            </a:r>
-            <a:r>
-              <a:rPr lang="en-US" altLang="pt-BR" sz="2000" b="1" dirty="0" smtClean="0">
+              <a:t>async</a:t>
+            </a:r>
+            <a:r>
+              <a:rPr lang="en-US" altLang="pt-BR" sz="1800" b="1" dirty="0" smtClean="0">
+                <a:solidFill>
+                  <a:srgbClr val="C00000"/>
+                </a:solidFill>
                 <a:cs typeface="Arial" pitchFamily="34" charset="0"/>
               </a:rPr>
               <a:t> </a:t>
             </a:r>
             <a:r>
-              <a:rPr lang="en-US" altLang="pt-BR" sz="2000" b="1" i="1" dirty="0" smtClean="0">
-                <a:solidFill>
-                  <a:srgbClr val="C00000"/>
-                </a:solidFill>
+              <a:rPr lang="en-US" altLang="pt-BR" sz="1800" b="1" dirty="0" smtClean="0">
                 <a:cs typeface="Arial" pitchFamily="34" charset="0"/>
               </a:rPr>
-              <a:t> </a:t>
-            </a:r>
-            <a:r>
-              <a:rPr lang="en-US" altLang="pt-BR" sz="2000" b="1" i="1" dirty="0" err="1" smtClean="0">
+              <a:t>(</a:t>
+            </a:r>
+            <a:r>
+              <a:rPr lang="en-US" altLang="pt-BR" sz="1800" b="1" dirty="0" err="1" smtClean="0">
                 <a:cs typeface="Arial" pitchFamily="34" charset="0"/>
               </a:rPr>
+              <a:t>p,l</a:t>
+            </a:r>
+            <a:r>
+              <a:rPr lang="en-US" altLang="pt-BR" sz="1800" b="1" dirty="0" smtClean="0">
+                <a:cs typeface="Arial" pitchFamily="34" charset="0"/>
+              </a:rPr>
+              <a:t>)  </a:t>
+            </a:r>
+            <a:r>
+              <a:rPr lang="en-US" altLang="pt-BR" sz="1800" b="1" dirty="0" err="1" smtClean="0">
+                <a:cs typeface="Arial" pitchFamily="34" charset="0"/>
+              </a:rPr>
               <a:t>Stmt</a:t>
             </a:r>
-            <a:endParaRPr lang="en-US" altLang="pt-BR" sz="2000" b="1" i="1" dirty="0" smtClean="0">
+            <a:endParaRPr lang="en-US" altLang="pt-BR" sz="1800" b="1" dirty="0" smtClean="0">
               <a:cs typeface="Arial" pitchFamily="34" charset="0"/>
             </a:endParaRPr>
           </a:p>
           <a:p>
             <a:endParaRPr lang="en-US" altLang="pt-BR" sz="1800" dirty="0" smtClean="0">
-              <a:solidFill>
-                <a:srgbClr val="000000"/>
-              </a:solidFill>
               <a:cs typeface="Arial" pitchFamily="34" charset="0"/>
             </a:endParaRPr>
           </a:p>
           <a:p>
             <a:r>
-              <a:rPr lang="en-US" altLang="pt-BR" sz="1800" dirty="0">
-                <a:solidFill>
-                  <a:srgbClr val="000000"/>
-                </a:solidFill>
+              <a:rPr lang="en-US" altLang="pt-BR" sz="1800" dirty="0" err="1" smtClean="0">
                 <a:cs typeface="Arial" pitchFamily="34" charset="0"/>
               </a:rPr>
-              <a:t>f</a:t>
+              <a:t>async</a:t>
             </a:r>
             <a:r>
               <a:rPr lang="en-US" altLang="pt-BR" sz="1800" dirty="0" smtClean="0">
-                <a:solidFill>
-                  <a:srgbClr val="000000"/>
-                </a:solidFill>
                 <a:cs typeface="Arial" pitchFamily="34" charset="0"/>
               </a:rPr>
-              <a:t>inish { … }</a:t>
+              <a:t> { … }</a:t>
             </a:r>
           </a:p>
           <a:p>
             <a:endParaRPr lang="en-US" altLang="pt-BR" sz="1800" dirty="0" smtClean="0">
-              <a:solidFill>
-                <a:srgbClr val="000000"/>
-              </a:solidFill>
               <a:cs typeface="Arial" pitchFamily="34" charset="0"/>
             </a:endParaRPr>
           </a:p>
           <a:p>
             <a:r>
               <a:rPr lang="en-US" altLang="pt-BR" sz="1800" dirty="0" err="1" smtClean="0">
-                <a:solidFill>
-                  <a:srgbClr val="000000"/>
-                </a:solidFill>
                 <a:cs typeface="Arial" pitchFamily="34" charset="0"/>
               </a:rPr>
-              <a:t>Avalia</a:t>
+              <a:t>Cria</a:t>
             </a:r>
             <a:r>
               <a:rPr lang="en-US" altLang="pt-BR" sz="1800" dirty="0" smtClean="0">
-                <a:solidFill>
-                  <a:srgbClr val="000000"/>
-                </a:solidFill>
                 <a:cs typeface="Arial" pitchFamily="34" charset="0"/>
               </a:rPr>
               <a:t> </a:t>
             </a:r>
             <a:r>
               <a:rPr lang="en-US" altLang="pt-BR" sz="1800" dirty="0" err="1" smtClean="0">
-                <a:solidFill>
-                  <a:srgbClr val="000000"/>
-                </a:solidFill>
                 <a:cs typeface="Arial" pitchFamily="34" charset="0"/>
               </a:rPr>
               <a:t>uma</a:t>
             </a:r>
             <a:r>
               <a:rPr lang="en-US" altLang="pt-BR" sz="1800" dirty="0" smtClean="0">
-                <a:solidFill>
-                  <a:srgbClr val="000000"/>
-                </a:solidFill>
                 <a:cs typeface="Arial" pitchFamily="34" charset="0"/>
               </a:rPr>
+              <a:t> nova </a:t>
+            </a:r>
+            <a:r>
+              <a:rPr lang="en-US" altLang="pt-BR" sz="1800" dirty="0" err="1" smtClean="0">
+                <a:cs typeface="Arial" pitchFamily="34" charset="0"/>
+              </a:rPr>
+              <a:t>atividade</a:t>
+            </a:r>
+            <a:r>
+              <a:rPr lang="en-US" altLang="pt-BR" sz="1800" dirty="0" smtClean="0">
+                <a:cs typeface="Arial" pitchFamily="34" charset="0"/>
+              </a:rPr>
+              <a:t> para </a:t>
+            </a:r>
+            <a:r>
+              <a:rPr lang="en-US" altLang="pt-BR" sz="1800" dirty="0" err="1" smtClean="0">
+                <a:cs typeface="Arial" pitchFamily="34" charset="0"/>
+              </a:rPr>
+              <a:t>avaliar</a:t>
+            </a:r>
+            <a:r>
+              <a:rPr lang="en-US" altLang="pt-BR" sz="1800" dirty="0" smtClean="0">
+                <a:cs typeface="Arial" pitchFamily="34" charset="0"/>
+              </a:rPr>
               <a:t> </a:t>
             </a:r>
             <a:r>
               <a:rPr lang="en-US" altLang="pt-BR" sz="1800" dirty="0" err="1" smtClean="0">
-                <a:solidFill>
-                  <a:srgbClr val="000000"/>
-                </a:solidFill>
                 <a:cs typeface="Arial" pitchFamily="34" charset="0"/>
               </a:rPr>
-              <a:t>expressão</a:t>
+              <a:t>comandos</a:t>
             </a:r>
             <a:r>
               <a:rPr lang="en-US" altLang="pt-BR" sz="1800" dirty="0" smtClean="0">
-                <a:solidFill>
-                  <a:srgbClr val="000000"/>
-                </a:solidFill>
                 <a:cs typeface="Arial" pitchFamily="34" charset="0"/>
               </a:rPr>
-              <a:t>, </a:t>
+              <a:t> de </a:t>
             </a:r>
             <a:r>
               <a:rPr lang="en-US" altLang="pt-BR" sz="1800" dirty="0" err="1" smtClean="0">
-                <a:solidFill>
-                  <a:srgbClr val="000000"/>
-                </a:solidFill>
                 <a:cs typeface="Arial" pitchFamily="34" charset="0"/>
               </a:rPr>
-              <a:t>esperando</a:t>
+              <a:t>maneira</a:t>
             </a:r>
             <a:r>
               <a:rPr lang="en-US" altLang="pt-BR" sz="1800" dirty="0" smtClean="0">
-                <a:solidFill>
-                  <a:srgbClr val="000000"/>
-                </a:solidFill>
                 <a:cs typeface="Arial" pitchFamily="34" charset="0"/>
               </a:rPr>
               <a:t> </a:t>
             </a:r>
             <a:r>
               <a:rPr lang="en-US" altLang="pt-BR" sz="1800" dirty="0" err="1" smtClean="0">
-                <a:solidFill>
-                  <a:srgbClr val="000000"/>
-                </a:solidFill>
                 <a:cs typeface="Arial" pitchFamily="34" charset="0"/>
               </a:rPr>
-              <a:t>todas</a:t>
+              <a:t>assíncrona</a:t>
             </a:r>
             <a:r>
               <a:rPr lang="en-US" altLang="pt-BR" sz="1800" dirty="0" smtClean="0">
-                <a:solidFill>
-                  <a:srgbClr val="000000"/>
-                </a:solidFill>
                 <a:cs typeface="Arial" pitchFamily="34" charset="0"/>
               </a:rPr>
-              <a:t> as </a:t>
-            </a:r>
-            <a:r>
-              <a:rPr lang="en-US" altLang="pt-BR" sz="1800" dirty="0" err="1" smtClean="0">
-                <a:solidFill>
-                  <a:srgbClr val="000000"/>
-                </a:solidFill>
-                <a:cs typeface="Arial" pitchFamily="34" charset="0"/>
-              </a:rPr>
-              <a:t>atividades</a:t>
-            </a:r>
-            <a:r>
-              <a:rPr lang="en-US" altLang="pt-BR" sz="1800" dirty="0" smtClean="0">
-                <a:solidFill>
-                  <a:srgbClr val="000000"/>
-                </a:solidFill>
-                <a:cs typeface="Arial" pitchFamily="34" charset="0"/>
-              </a:rPr>
-              <a:t> </a:t>
-            </a:r>
-            <a:r>
-              <a:rPr lang="en-US" altLang="pt-BR" sz="1800" dirty="0" err="1" smtClean="0">
-                <a:solidFill>
-                  <a:srgbClr val="000000"/>
-                </a:solidFill>
-                <a:cs typeface="Arial" pitchFamily="34" charset="0"/>
-              </a:rPr>
-              <a:t>criadas</a:t>
-            </a:r>
-            <a:r>
-              <a:rPr lang="en-US" altLang="pt-BR" sz="1800" dirty="0" smtClean="0">
-                <a:solidFill>
-                  <a:srgbClr val="000000"/>
-                </a:solidFill>
-                <a:cs typeface="Arial" pitchFamily="34" charset="0"/>
-              </a:rPr>
-              <a:t> </a:t>
-            </a:r>
-            <a:r>
-              <a:rPr lang="en-US" altLang="pt-BR" sz="1800" dirty="0" err="1" smtClean="0">
-                <a:solidFill>
-                  <a:srgbClr val="000000"/>
-                </a:solidFill>
-                <a:cs typeface="Arial" pitchFamily="34" charset="0"/>
-              </a:rPr>
-              <a:t>por</a:t>
-            </a:r>
-            <a:r>
-              <a:rPr lang="en-US" altLang="pt-BR" sz="1800" dirty="0" smtClean="0">
-                <a:solidFill>
-                  <a:srgbClr val="000000"/>
-                </a:solidFill>
-                <a:cs typeface="Arial" pitchFamily="34" charset="0"/>
-              </a:rPr>
-              <a:t> </a:t>
-            </a:r>
-            <a:r>
-              <a:rPr lang="en-US" altLang="pt-BR" sz="1800" dirty="0" err="1" smtClean="0">
-                <a:solidFill>
-                  <a:srgbClr val="000000"/>
-                </a:solidFill>
-                <a:cs typeface="Arial" pitchFamily="34" charset="0"/>
-              </a:rPr>
-              <a:t>chamadas</a:t>
-            </a:r>
-            <a:r>
-              <a:rPr lang="en-US" altLang="pt-BR" sz="1800" dirty="0" smtClean="0">
-                <a:solidFill>
-                  <a:srgbClr val="000000"/>
-                </a:solidFill>
-                <a:cs typeface="Arial" pitchFamily="34" charset="0"/>
-              </a:rPr>
-              <a:t> </a:t>
-            </a:r>
-            <a:r>
-              <a:rPr lang="en-US" altLang="pt-BR" sz="1800" dirty="0" err="1" smtClean="0">
-                <a:solidFill>
-                  <a:srgbClr val="000000"/>
-                </a:solidFill>
-                <a:cs typeface="Arial" pitchFamily="34" charset="0"/>
-              </a:rPr>
-              <a:t>async</a:t>
-            </a:r>
-            <a:r>
-              <a:rPr lang="en-US" altLang="pt-BR" sz="1800" dirty="0" smtClean="0">
-                <a:solidFill>
-                  <a:srgbClr val="000000"/>
-                </a:solidFill>
-                <a:cs typeface="Arial" pitchFamily="34" charset="0"/>
-              </a:rPr>
-              <a:t> </a:t>
-            </a:r>
-            <a:r>
-              <a:rPr lang="en-US" altLang="pt-BR" sz="1800" dirty="0" err="1" smtClean="0">
-                <a:solidFill>
-                  <a:srgbClr val="000000"/>
-                </a:solidFill>
-                <a:cs typeface="Arial" pitchFamily="34" charset="0"/>
-              </a:rPr>
-              <a:t>terminarem</a:t>
-            </a:r>
-            <a:r>
-              <a:rPr lang="en-US" altLang="pt-BR" sz="1800" dirty="0" smtClean="0">
-                <a:solidFill>
-                  <a:srgbClr val="000000"/>
-                </a:solidFill>
-                <a:cs typeface="Arial" pitchFamily="34" charset="0"/>
-              </a:rPr>
               <a:t>.</a:t>
             </a:r>
           </a:p>
           <a:p>
-            <a:endParaRPr lang="en-US" altLang="pt-BR" sz="1800" dirty="0" smtClean="0">
-              <a:solidFill>
-                <a:srgbClr val="000000"/>
-              </a:solidFill>
-              <a:cs typeface="Arial" pitchFamily="34" charset="0"/>
-            </a:endParaRPr>
-          </a:p>
-          <a:p>
-            <a:r>
-              <a:rPr lang="en-US" altLang="pt-BR" sz="1800" dirty="0" err="1" smtClean="0">
-                <a:solidFill>
-                  <a:srgbClr val="000000"/>
-                </a:solidFill>
-                <a:cs typeface="Arial" pitchFamily="34" charset="0"/>
-              </a:rPr>
-              <a:t>Pode</a:t>
-            </a:r>
-            <a:r>
-              <a:rPr lang="en-US" altLang="pt-BR" sz="1800" dirty="0" smtClean="0">
-                <a:solidFill>
-                  <a:srgbClr val="000000"/>
-                </a:solidFill>
-                <a:cs typeface="Arial" pitchFamily="34" charset="0"/>
-              </a:rPr>
-              <a:t> </a:t>
-            </a:r>
-            <a:r>
-              <a:rPr lang="en-US" altLang="pt-BR" sz="1800" dirty="0" err="1" smtClean="0">
-                <a:solidFill>
-                  <a:srgbClr val="000000"/>
-                </a:solidFill>
-                <a:cs typeface="Arial" pitchFamily="34" charset="0"/>
-              </a:rPr>
-              <a:t>ser</a:t>
-            </a:r>
-            <a:r>
-              <a:rPr lang="en-US" altLang="pt-BR" sz="1800" dirty="0" smtClean="0">
-                <a:solidFill>
-                  <a:srgbClr val="000000"/>
-                </a:solidFill>
-                <a:cs typeface="Arial" pitchFamily="34" charset="0"/>
-              </a:rPr>
-              <a:t> </a:t>
-            </a:r>
-            <a:r>
-              <a:rPr lang="en-US" altLang="pt-BR" sz="1800" dirty="0" err="1" smtClean="0">
-                <a:solidFill>
-                  <a:srgbClr val="000000"/>
-                </a:solidFill>
-                <a:cs typeface="Arial" pitchFamily="34" charset="0"/>
-              </a:rPr>
-              <a:t>considerado</a:t>
-            </a:r>
-            <a:r>
-              <a:rPr lang="en-US" altLang="pt-BR" sz="1800" dirty="0" smtClean="0">
-                <a:solidFill>
-                  <a:srgbClr val="000000"/>
-                </a:solidFill>
-                <a:cs typeface="Arial" pitchFamily="34" charset="0"/>
-              </a:rPr>
-              <a:t> um </a:t>
-            </a:r>
-            <a:r>
-              <a:rPr lang="en-US" altLang="pt-BR" sz="1800" dirty="0" err="1" smtClean="0">
-                <a:solidFill>
-                  <a:srgbClr val="000000"/>
-                </a:solidFill>
-                <a:cs typeface="Arial" pitchFamily="34" charset="0"/>
-              </a:rPr>
-              <a:t>mecanismo</a:t>
-            </a:r>
-            <a:r>
-              <a:rPr lang="en-US" altLang="pt-BR" sz="1800" dirty="0" smtClean="0">
-                <a:solidFill>
-                  <a:srgbClr val="000000"/>
-                </a:solidFill>
-                <a:cs typeface="Arial" pitchFamily="34" charset="0"/>
-              </a:rPr>
-              <a:t> de </a:t>
-            </a:r>
-            <a:r>
-              <a:rPr lang="en-US" altLang="pt-BR" sz="1800" dirty="0" err="1" smtClean="0">
-                <a:solidFill>
-                  <a:srgbClr val="000000"/>
-                </a:solidFill>
-                <a:cs typeface="Arial" pitchFamily="34" charset="0"/>
-              </a:rPr>
-              <a:t>barreira</a:t>
-            </a:r>
-            <a:r>
-              <a:rPr lang="en-US" altLang="pt-BR" sz="1800" dirty="0" smtClean="0">
-                <a:solidFill>
-                  <a:srgbClr val="000000"/>
-                </a:solidFill>
-                <a:cs typeface="Arial" pitchFamily="34" charset="0"/>
-              </a:rPr>
-              <a:t>.</a:t>
-            </a:r>
-          </a:p>
-          <a:p>
-            <a:endParaRPr lang="pt-BR" sz="1800" dirty="0" smtClean="0"/>
-          </a:p>
-          <a:p>
-            <a:r>
-              <a:rPr lang="pt-BR" sz="1800" dirty="0" smtClean="0"/>
-              <a:t>Útil para expressar operações “síncronas”.</a:t>
-            </a:r>
-          </a:p>
-          <a:p>
-            <a:endParaRPr lang="pt-BR" sz="1800" dirty="0"/>
-          </a:p>
-          <a:p>
-            <a:endParaRPr lang="pt-BR" sz="2000" dirty="0" smtClean="0"/>
+            <a:endParaRPr lang="pt-BR" dirty="0"/>
           </a:p>
         </p:txBody>
       </p:sp>
     </p:spTree>
     <p:extLst>
       <p:ext uri="{BB962C8B-B14F-4D97-AF65-F5344CB8AC3E}">
-        <p14:creationId xmlns:p14="http://schemas.microsoft.com/office/powerpoint/2010/main" val="3994443213"/>
+        <p14:creationId xmlns:p14="http://schemas.microsoft.com/office/powerpoint/2010/main" val="404802352"/>
       </p:ext>
     </p:extLst>
   </p:cSld>
   <p:clrMapOvr>
     <a:masterClrMapping/>
   </p:clrMapOvr>
+  <p:timing>
+    <p:tnLst>
+      <p:par>
+        <p:cTn id="1" dur="indefinite" restart="never" nodeType="tmRoot"/>
+      </p:par>
+    </p:tnLst>
+  </p:timing>
 </p:sld>
 </file>
 

</xml_diff>